<commit_message>
Rotas Filhas - criação de 2 componentes subitem de curso
</commit_message>
<xml_diff>
--- a/presentations/TreinamentoAngular.pptx
+++ b/presentations/TreinamentoAngular.pptx
@@ -9,7 +9,7 @@
     <p:sldMasterId id="2147483764" r:id="rId8"/>
   </p:sldMasterIdLst>
   <p:notesMasterIdLst>
-    <p:notesMasterId r:id="rId18"/>
+    <p:notesMasterId r:id="rId21"/>
   </p:notesMasterIdLst>
   <p:sldIdLst>
     <p:sldId id="314" r:id="rId9"/>
@@ -21,6 +21,9 @@
     <p:sldId id="323" r:id="rId15"/>
     <p:sldId id="319" r:id="rId16"/>
     <p:sldId id="324" r:id="rId17"/>
+    <p:sldId id="325" r:id="rId18"/>
+    <p:sldId id="326" r:id="rId19"/>
+    <p:sldId id="327" r:id="rId20"/>
   </p:sldIdLst>
   <p:sldSz cx="12192000" cy="6858000"/>
   <p:notesSz cx="6858000" cy="9144000"/>
@@ -133,6 +136,9 @@
             <p14:sldId id="323"/>
             <p14:sldId id="319"/>
             <p14:sldId id="324"/>
+            <p14:sldId id="325"/>
+            <p14:sldId id="326"/>
+            <p14:sldId id="327"/>
           </p14:sldIdLst>
         </p14:section>
         <p14:section name="Fim" id="{9EEAA474-718D-43F4-9556-5E5EAE13E381}">
@@ -7820,6 +7826,653 @@
 </p:sld>
 </file>
 
+<file path=ppt/slides/slide10.xml><?xml version="1.0" encoding="utf-8"?>
+<p:sld xmlns:a="http://schemas.openxmlformats.org/drawingml/2006/main" xmlns:r="http://schemas.openxmlformats.org/officeDocument/2006/relationships" xmlns:p="http://schemas.openxmlformats.org/presentationml/2006/main">
+  <p:cSld>
+    <p:spTree>
+      <p:nvGrpSpPr>
+        <p:cNvPr id="1" name=""/>
+        <p:cNvGrpSpPr/>
+        <p:nvPr/>
+      </p:nvGrpSpPr>
+      <p:grpSpPr>
+        <a:xfrm>
+          <a:off x="0" y="0"/>
+          <a:ext cx="0" cy="0"/>
+          <a:chOff x="0" y="0"/>
+          <a:chExt cx="0" cy="0"/>
+        </a:xfrm>
+      </p:grpSpPr>
+      <p:sp>
+        <p:nvSpPr>
+          <p:cNvPr id="2" name="Slide Number Placeholder 1"/>
+          <p:cNvSpPr>
+            <a:spLocks noGrp="1"/>
+          </p:cNvSpPr>
+          <p:nvPr>
+            <p:ph type="sldNum" sz="quarter" idx="12"/>
+          </p:nvPr>
+        </p:nvSpPr>
+        <p:spPr/>
+        <p:txBody>
+          <a:bodyPr/>
+          <a:lstStyle/>
+          <a:p>
+            <a:fld id="{3847DB54-D037-B84F-B6F1-2E8DA40D09AD}" type="slidenum">
+              <a:rPr lang="en-US" smtClean="0"/>
+              <a:pPr/>
+              <a:t>10</a:t>
+            </a:fld>
+            <a:endParaRPr lang="en-US"/>
+          </a:p>
+        </p:txBody>
+      </p:sp>
+      <p:sp>
+        <p:nvSpPr>
+          <p:cNvPr id="5" name="Title 4"/>
+          <p:cNvSpPr>
+            <a:spLocks noGrp="1"/>
+          </p:cNvSpPr>
+          <p:nvPr>
+            <p:ph type="title"/>
+          </p:nvPr>
+        </p:nvSpPr>
+        <p:spPr>
+          <a:xfrm>
+            <a:off x="960792" y="390719"/>
+            <a:ext cx="10270415" cy="834964"/>
+          </a:xfrm>
+        </p:spPr>
+        <p:txBody>
+          <a:bodyPr/>
+          <a:lstStyle/>
+          <a:p>
+            <a:r>
+              <a:rPr lang="pt-BR" dirty="0"/>
+              <a:t>Rotas – criação de rota filha</a:t>
+            </a:r>
+            <a:endParaRPr lang="en-US" dirty="0"/>
+          </a:p>
+        </p:txBody>
+      </p:sp>
+      <p:pic>
+        <p:nvPicPr>
+          <p:cNvPr id="9" name="Picture 2" descr="Resultado de imagem para angularjs logo"/>
+          <p:cNvPicPr>
+            <a:picLocks noChangeAspect="1" noChangeArrowheads="1"/>
+          </p:cNvPicPr>
+          <p:nvPr/>
+        </p:nvPicPr>
+        <p:blipFill>
+          <a:blip r:embed="rId2">
+            <a:extLst>
+              <a:ext uri="{28A0092B-C50C-407E-A947-70E740481C1C}">
+                <a14:useLocalDpi xmlns:a14="http://schemas.microsoft.com/office/drawing/2010/main" val="0"/>
+              </a:ext>
+            </a:extLst>
+          </a:blip>
+          <a:srcRect/>
+          <a:stretch>
+            <a:fillRect/>
+          </a:stretch>
+        </p:blipFill>
+        <p:spPr bwMode="auto">
+          <a:xfrm>
+            <a:off x="10415820" y="222684"/>
+            <a:ext cx="2126430" cy="1275858"/>
+          </a:xfrm>
+          <a:prstGeom prst="rect">
+            <a:avLst/>
+          </a:prstGeom>
+          <a:noFill/>
+          <a:extLst>
+            <a:ext uri="{909E8E84-426E-40DD-AFC4-6F175D3DCCD1}">
+              <a14:hiddenFill xmlns:a14="http://schemas.microsoft.com/office/drawing/2010/main">
+                <a:solidFill>
+                  <a:srgbClr val="FFFFFF"/>
+                </a:solidFill>
+              </a14:hiddenFill>
+            </a:ext>
+          </a:extLst>
+        </p:spPr>
+      </p:pic>
+      <p:sp>
+        <p:nvSpPr>
+          <p:cNvPr id="3" name="Rectangle 2"/>
+          <p:cNvSpPr/>
+          <p:nvPr/>
+        </p:nvSpPr>
+        <p:spPr>
+          <a:xfrm>
+            <a:off x="960792" y="867980"/>
+            <a:ext cx="10006520" cy="456215"/>
+          </a:xfrm>
+          <a:prstGeom prst="rect">
+            <a:avLst/>
+          </a:prstGeom>
+        </p:spPr>
+        <p:txBody>
+          <a:bodyPr wrap="square">
+            <a:spAutoFit/>
+          </a:bodyPr>
+          <a:lstStyle/>
+          <a:p>
+            <a:pPr marL="285750" indent="-285750">
+              <a:lnSpc>
+                <a:spcPct val="150000"/>
+              </a:lnSpc>
+              <a:buFont typeface="Arial" panose="020B0604020202020204" pitchFamily="34" charset="0"/>
+              <a:buChar char="•"/>
+            </a:pPr>
+            <a:r>
+              <a:rPr lang="pt-BR" dirty="0"/>
+              <a:t>Alterar o app.routing.module.ts</a:t>
+            </a:r>
+          </a:p>
+        </p:txBody>
+      </p:sp>
+      <p:pic>
+        <p:nvPicPr>
+          <p:cNvPr id="8" name="Picture 7">
+            <a:extLst>
+              <a:ext uri="{FF2B5EF4-FFF2-40B4-BE49-F238E27FC236}">
+                <a16:creationId xmlns:a16="http://schemas.microsoft.com/office/drawing/2014/main" id="{295C5D81-1466-48CB-BF3E-C29466D8CCB8}"/>
+              </a:ext>
+            </a:extLst>
+          </p:cNvPr>
+          <p:cNvPicPr>
+            <a:picLocks noChangeAspect="1"/>
+          </p:cNvPicPr>
+          <p:nvPr/>
+        </p:nvPicPr>
+        <p:blipFill>
+          <a:blip r:embed="rId3"/>
+          <a:stretch>
+            <a:fillRect/>
+          </a:stretch>
+        </p:blipFill>
+        <p:spPr>
+          <a:xfrm>
+            <a:off x="2195415" y="1324195"/>
+            <a:ext cx="7239000" cy="4981575"/>
+          </a:xfrm>
+          <a:prstGeom prst="rect">
+            <a:avLst/>
+          </a:prstGeom>
+        </p:spPr>
+      </p:pic>
+    </p:spTree>
+    <p:extLst>
+      <p:ext uri="{BB962C8B-B14F-4D97-AF65-F5344CB8AC3E}">
+        <p14:creationId xmlns:p14="http://schemas.microsoft.com/office/powerpoint/2010/main" val="3479112667"/>
+      </p:ext>
+    </p:extLst>
+  </p:cSld>
+  <p:clrMapOvr>
+    <a:masterClrMapping/>
+  </p:clrMapOvr>
+  <p:transition>
+    <p:fade/>
+  </p:transition>
+</p:sld>
+</file>
+
+<file path=ppt/slides/slide11.xml><?xml version="1.0" encoding="utf-8"?>
+<p:sld xmlns:a="http://schemas.openxmlformats.org/drawingml/2006/main" xmlns:r="http://schemas.openxmlformats.org/officeDocument/2006/relationships" xmlns:p="http://schemas.openxmlformats.org/presentationml/2006/main">
+  <p:cSld>
+    <p:spTree>
+      <p:nvGrpSpPr>
+        <p:cNvPr id="1" name=""/>
+        <p:cNvGrpSpPr/>
+        <p:nvPr/>
+      </p:nvGrpSpPr>
+      <p:grpSpPr>
+        <a:xfrm>
+          <a:off x="0" y="0"/>
+          <a:ext cx="0" cy="0"/>
+          <a:chOff x="0" y="0"/>
+          <a:chExt cx="0" cy="0"/>
+        </a:xfrm>
+      </p:grpSpPr>
+      <p:sp>
+        <p:nvSpPr>
+          <p:cNvPr id="2" name="Slide Number Placeholder 1"/>
+          <p:cNvSpPr>
+            <a:spLocks noGrp="1"/>
+          </p:cNvSpPr>
+          <p:nvPr>
+            <p:ph type="sldNum" sz="quarter" idx="12"/>
+          </p:nvPr>
+        </p:nvSpPr>
+        <p:spPr/>
+        <p:txBody>
+          <a:bodyPr/>
+          <a:lstStyle/>
+          <a:p>
+            <a:fld id="{3847DB54-D037-B84F-B6F1-2E8DA40D09AD}" type="slidenum">
+              <a:rPr lang="en-US" smtClean="0"/>
+              <a:pPr/>
+              <a:t>11</a:t>
+            </a:fld>
+            <a:endParaRPr lang="en-US"/>
+          </a:p>
+        </p:txBody>
+      </p:sp>
+      <p:sp>
+        <p:nvSpPr>
+          <p:cNvPr id="5" name="Title 4"/>
+          <p:cNvSpPr>
+            <a:spLocks noGrp="1"/>
+          </p:cNvSpPr>
+          <p:nvPr>
+            <p:ph type="title"/>
+          </p:nvPr>
+        </p:nvSpPr>
+        <p:spPr>
+          <a:xfrm>
+            <a:off x="960792" y="390719"/>
+            <a:ext cx="10270415" cy="834964"/>
+          </a:xfrm>
+        </p:spPr>
+        <p:txBody>
+          <a:bodyPr/>
+          <a:lstStyle/>
+          <a:p>
+            <a:r>
+              <a:rPr lang="pt-BR" dirty="0"/>
+              <a:t>Rotas – criação de rota filha</a:t>
+            </a:r>
+            <a:endParaRPr lang="en-US" dirty="0"/>
+          </a:p>
+        </p:txBody>
+      </p:sp>
+      <p:pic>
+        <p:nvPicPr>
+          <p:cNvPr id="9" name="Picture 2" descr="Resultado de imagem para angularjs logo"/>
+          <p:cNvPicPr>
+            <a:picLocks noChangeAspect="1" noChangeArrowheads="1"/>
+          </p:cNvPicPr>
+          <p:nvPr/>
+        </p:nvPicPr>
+        <p:blipFill>
+          <a:blip r:embed="rId2">
+            <a:extLst>
+              <a:ext uri="{28A0092B-C50C-407E-A947-70E740481C1C}">
+                <a14:useLocalDpi xmlns:a14="http://schemas.microsoft.com/office/drawing/2010/main" val="0"/>
+              </a:ext>
+            </a:extLst>
+          </a:blip>
+          <a:srcRect/>
+          <a:stretch>
+            <a:fillRect/>
+          </a:stretch>
+        </p:blipFill>
+        <p:spPr bwMode="auto">
+          <a:xfrm>
+            <a:off x="10415820" y="222684"/>
+            <a:ext cx="2126430" cy="1275858"/>
+          </a:xfrm>
+          <a:prstGeom prst="rect">
+            <a:avLst/>
+          </a:prstGeom>
+          <a:noFill/>
+          <a:extLst>
+            <a:ext uri="{909E8E84-426E-40DD-AFC4-6F175D3DCCD1}">
+              <a14:hiddenFill xmlns:a14="http://schemas.microsoft.com/office/drawing/2010/main">
+                <a:solidFill>
+                  <a:srgbClr val="FFFFFF"/>
+                </a:solidFill>
+              </a14:hiddenFill>
+            </a:ext>
+          </a:extLst>
+        </p:spPr>
+      </p:pic>
+      <p:sp>
+        <p:nvSpPr>
+          <p:cNvPr id="3" name="Rectangle 2"/>
+          <p:cNvSpPr/>
+          <p:nvPr/>
+        </p:nvSpPr>
+        <p:spPr>
+          <a:xfrm>
+            <a:off x="960792" y="1134005"/>
+            <a:ext cx="10006520" cy="923330"/>
+          </a:xfrm>
+          <a:prstGeom prst="rect">
+            <a:avLst/>
+          </a:prstGeom>
+        </p:spPr>
+        <p:txBody>
+          <a:bodyPr wrap="square">
+            <a:spAutoFit/>
+          </a:bodyPr>
+          <a:lstStyle/>
+          <a:p>
+            <a:pPr marL="285750" indent="-285750">
+              <a:lnSpc>
+                <a:spcPct val="150000"/>
+              </a:lnSpc>
+              <a:buFont typeface="Arial" panose="020B0604020202020204" pitchFamily="34" charset="0"/>
+              <a:buChar char="•"/>
+            </a:pPr>
+            <a:r>
+              <a:rPr lang="pt-BR" dirty="0"/>
+              <a:t>Alterar </a:t>
+            </a:r>
+            <a:r>
+              <a:rPr lang="pt-BR" b="1" dirty="0"/>
+              <a:t>o cursos\cursos.component.ts</a:t>
+            </a:r>
+          </a:p>
+          <a:p>
+            <a:pPr>
+              <a:lnSpc>
+                <a:spcPct val="150000"/>
+              </a:lnSpc>
+            </a:pPr>
+            <a:r>
+              <a:rPr lang="pt-BR" b="1" dirty="0"/>
+              <a:t>     </a:t>
+            </a:r>
+            <a:r>
+              <a:rPr lang="pt-BR" dirty="0"/>
+              <a:t>Incluindo a tag router-outlet</a:t>
+            </a:r>
+          </a:p>
+        </p:txBody>
+      </p:sp>
+      <p:pic>
+        <p:nvPicPr>
+          <p:cNvPr id="7" name="Picture 6">
+            <a:extLst>
+              <a:ext uri="{FF2B5EF4-FFF2-40B4-BE49-F238E27FC236}">
+                <a16:creationId xmlns:a16="http://schemas.microsoft.com/office/drawing/2014/main" id="{F337E2D3-BDB6-4DB3-A7F3-BD55337D9574}"/>
+              </a:ext>
+            </a:extLst>
+          </p:cNvPr>
+          <p:cNvPicPr>
+            <a:picLocks noChangeAspect="1"/>
+          </p:cNvPicPr>
+          <p:nvPr/>
+        </p:nvPicPr>
+        <p:blipFill>
+          <a:blip r:embed="rId3"/>
+          <a:stretch>
+            <a:fillRect/>
+          </a:stretch>
+        </p:blipFill>
+        <p:spPr>
+          <a:xfrm>
+            <a:off x="1481699" y="2166426"/>
+            <a:ext cx="7033651" cy="1924562"/>
+          </a:xfrm>
+          <a:prstGeom prst="rect">
+            <a:avLst/>
+          </a:prstGeom>
+        </p:spPr>
+      </p:pic>
+    </p:spTree>
+    <p:extLst>
+      <p:ext uri="{BB962C8B-B14F-4D97-AF65-F5344CB8AC3E}">
+        <p14:creationId xmlns:p14="http://schemas.microsoft.com/office/powerpoint/2010/main" val="3886400601"/>
+      </p:ext>
+    </p:extLst>
+  </p:cSld>
+  <p:clrMapOvr>
+    <a:masterClrMapping/>
+  </p:clrMapOvr>
+  <p:transition>
+    <p:fade/>
+  </p:transition>
+</p:sld>
+</file>
+
+<file path=ppt/slides/slide12.xml><?xml version="1.0" encoding="utf-8"?>
+<p:sld xmlns:a="http://schemas.openxmlformats.org/drawingml/2006/main" xmlns:r="http://schemas.openxmlformats.org/officeDocument/2006/relationships" xmlns:p="http://schemas.openxmlformats.org/presentationml/2006/main">
+  <p:cSld>
+    <p:spTree>
+      <p:nvGrpSpPr>
+        <p:cNvPr id="1" name=""/>
+        <p:cNvGrpSpPr/>
+        <p:nvPr/>
+      </p:nvGrpSpPr>
+      <p:grpSpPr>
+        <a:xfrm>
+          <a:off x="0" y="0"/>
+          <a:ext cx="0" cy="0"/>
+          <a:chOff x="0" y="0"/>
+          <a:chExt cx="0" cy="0"/>
+        </a:xfrm>
+      </p:grpSpPr>
+      <p:sp>
+        <p:nvSpPr>
+          <p:cNvPr id="2" name="Slide Number Placeholder 1"/>
+          <p:cNvSpPr>
+            <a:spLocks noGrp="1"/>
+          </p:cNvSpPr>
+          <p:nvPr>
+            <p:ph type="sldNum" sz="quarter" idx="12"/>
+          </p:nvPr>
+        </p:nvSpPr>
+        <p:spPr/>
+        <p:txBody>
+          <a:bodyPr/>
+          <a:lstStyle/>
+          <a:p>
+            <a:fld id="{3847DB54-D037-B84F-B6F1-2E8DA40D09AD}" type="slidenum">
+              <a:rPr lang="en-US" smtClean="0"/>
+              <a:pPr/>
+              <a:t>12</a:t>
+            </a:fld>
+            <a:endParaRPr lang="en-US"/>
+          </a:p>
+        </p:txBody>
+      </p:sp>
+      <p:sp>
+        <p:nvSpPr>
+          <p:cNvPr id="5" name="Title 4"/>
+          <p:cNvSpPr>
+            <a:spLocks noGrp="1"/>
+          </p:cNvSpPr>
+          <p:nvPr>
+            <p:ph type="title"/>
+          </p:nvPr>
+        </p:nvSpPr>
+        <p:spPr>
+          <a:xfrm>
+            <a:off x="960792" y="390719"/>
+            <a:ext cx="10270415" cy="834964"/>
+          </a:xfrm>
+        </p:spPr>
+        <p:txBody>
+          <a:bodyPr/>
+          <a:lstStyle/>
+          <a:p>
+            <a:r>
+              <a:rPr lang="pt-BR" dirty="0"/>
+              <a:t>Rotas – criação de rota filha</a:t>
+            </a:r>
+            <a:endParaRPr lang="en-US" dirty="0"/>
+          </a:p>
+        </p:txBody>
+      </p:sp>
+      <p:pic>
+        <p:nvPicPr>
+          <p:cNvPr id="9" name="Picture 2" descr="Resultado de imagem para angularjs logo"/>
+          <p:cNvPicPr>
+            <a:picLocks noChangeAspect="1" noChangeArrowheads="1"/>
+          </p:cNvPicPr>
+          <p:nvPr/>
+        </p:nvPicPr>
+        <p:blipFill>
+          <a:blip r:embed="rId2">
+            <a:extLst>
+              <a:ext uri="{28A0092B-C50C-407E-A947-70E740481C1C}">
+                <a14:useLocalDpi xmlns:a14="http://schemas.microsoft.com/office/drawing/2010/main" val="0"/>
+              </a:ext>
+            </a:extLst>
+          </a:blip>
+          <a:srcRect/>
+          <a:stretch>
+            <a:fillRect/>
+          </a:stretch>
+        </p:blipFill>
+        <p:spPr bwMode="auto">
+          <a:xfrm>
+            <a:off x="10415820" y="222684"/>
+            <a:ext cx="2126430" cy="1275858"/>
+          </a:xfrm>
+          <a:prstGeom prst="rect">
+            <a:avLst/>
+          </a:prstGeom>
+          <a:noFill/>
+          <a:extLst>
+            <a:ext uri="{909E8E84-426E-40DD-AFC4-6F175D3DCCD1}">
+              <a14:hiddenFill xmlns:a14="http://schemas.microsoft.com/office/drawing/2010/main">
+                <a:solidFill>
+                  <a:srgbClr val="FFFFFF"/>
+                </a:solidFill>
+              </a14:hiddenFill>
+            </a:ext>
+          </a:extLst>
+        </p:spPr>
+      </p:pic>
+      <p:sp>
+        <p:nvSpPr>
+          <p:cNvPr id="3" name="Rectangle 2"/>
+          <p:cNvSpPr/>
+          <p:nvPr/>
+        </p:nvSpPr>
+        <p:spPr>
+          <a:xfrm>
+            <a:off x="960792" y="3674011"/>
+            <a:ext cx="10006520" cy="1338828"/>
+          </a:xfrm>
+          <a:prstGeom prst="rect">
+            <a:avLst/>
+          </a:prstGeom>
+        </p:spPr>
+        <p:txBody>
+          <a:bodyPr wrap="square">
+            <a:spAutoFit/>
+          </a:bodyPr>
+          <a:lstStyle/>
+          <a:p>
+            <a:pPr marL="285750" indent="-285750">
+              <a:lnSpc>
+                <a:spcPct val="150000"/>
+              </a:lnSpc>
+              <a:buFont typeface="Arial" panose="020B0604020202020204" pitchFamily="34" charset="0"/>
+              <a:buChar char="•"/>
+            </a:pPr>
+            <a:r>
+              <a:rPr lang="pt-BR" dirty="0"/>
+              <a:t>Os dois componentes são renderizados</a:t>
+            </a:r>
+          </a:p>
+          <a:p>
+            <a:pPr marL="285750" indent="-285750">
+              <a:lnSpc>
+                <a:spcPct val="150000"/>
+              </a:lnSpc>
+              <a:buFont typeface="Arial" panose="020B0604020202020204" pitchFamily="34" charset="0"/>
+              <a:buChar char="•"/>
+            </a:pPr>
+            <a:r>
+              <a:rPr lang="pt-BR" dirty="0"/>
+              <a:t>A rota filha é utilizada para carregar dois componentes, e conforme o exemplo, primeiro a lista de curso(cursos works) e abaixo uma outra tela para inserir um novo curso (curso-form works)</a:t>
+            </a:r>
+          </a:p>
+        </p:txBody>
+      </p:sp>
+      <p:pic>
+        <p:nvPicPr>
+          <p:cNvPr id="4" name="Picture 3">
+            <a:extLst>
+              <a:ext uri="{FF2B5EF4-FFF2-40B4-BE49-F238E27FC236}">
+                <a16:creationId xmlns:a16="http://schemas.microsoft.com/office/drawing/2014/main" id="{529A79D9-2BE5-4110-A18B-113A4A087E24}"/>
+              </a:ext>
+            </a:extLst>
+          </p:cNvPr>
+          <p:cNvPicPr>
+            <a:picLocks noChangeAspect="1"/>
+          </p:cNvPicPr>
+          <p:nvPr/>
+        </p:nvPicPr>
+        <p:blipFill>
+          <a:blip r:embed="rId3"/>
+          <a:stretch>
+            <a:fillRect/>
+          </a:stretch>
+        </p:blipFill>
+        <p:spPr>
+          <a:xfrm>
+            <a:off x="4089717" y="1360784"/>
+            <a:ext cx="5585747" cy="2464300"/>
+          </a:xfrm>
+          <a:prstGeom prst="rect">
+            <a:avLst/>
+          </a:prstGeom>
+        </p:spPr>
+      </p:pic>
+      <p:sp>
+        <p:nvSpPr>
+          <p:cNvPr id="8" name="Rectangle 7">
+            <a:extLst>
+              <a:ext uri="{FF2B5EF4-FFF2-40B4-BE49-F238E27FC236}">
+                <a16:creationId xmlns:a16="http://schemas.microsoft.com/office/drawing/2014/main" id="{68905D47-4533-40E1-8BE3-F1630DC00262}"/>
+              </a:ext>
+            </a:extLst>
+          </p:cNvPr>
+          <p:cNvSpPr/>
+          <p:nvPr/>
+        </p:nvSpPr>
+        <p:spPr>
+          <a:xfrm>
+            <a:off x="1113192" y="1286405"/>
+            <a:ext cx="10006520" cy="456215"/>
+          </a:xfrm>
+          <a:prstGeom prst="rect">
+            <a:avLst/>
+          </a:prstGeom>
+        </p:spPr>
+        <p:txBody>
+          <a:bodyPr wrap="square">
+            <a:spAutoFit/>
+          </a:bodyPr>
+          <a:lstStyle/>
+          <a:p>
+            <a:pPr marL="285750" indent="-285750">
+              <a:lnSpc>
+                <a:spcPct val="150000"/>
+              </a:lnSpc>
+              <a:buFont typeface="Arial" panose="020B0604020202020204" pitchFamily="34" charset="0"/>
+              <a:buChar char="•"/>
+            </a:pPr>
+            <a:r>
+              <a:rPr lang="pt-BR" dirty="0"/>
+              <a:t>Ao realizar o teste</a:t>
+            </a:r>
+            <a:endParaRPr lang="pt-BR" b="1" dirty="0"/>
+          </a:p>
+        </p:txBody>
+      </p:sp>
+    </p:spTree>
+    <p:extLst>
+      <p:ext uri="{BB962C8B-B14F-4D97-AF65-F5344CB8AC3E}">
+        <p14:creationId xmlns:p14="http://schemas.microsoft.com/office/powerpoint/2010/main" val="206163335"/>
+      </p:ext>
+    </p:extLst>
+  </p:cSld>
+  <p:clrMapOvr>
+    <a:masterClrMapping/>
+  </p:clrMapOvr>
+  <p:transition>
+    <p:fade/>
+  </p:transition>
+</p:sld>
+</file>
+
 <file path=ppt/slides/slide2.xml><?xml version="1.0" encoding="utf-8"?>
 <p:sld xmlns:a="http://schemas.openxmlformats.org/drawingml/2006/main" xmlns:r="http://schemas.openxmlformats.org/officeDocument/2006/relationships" xmlns:p="http://schemas.openxmlformats.org/presentationml/2006/main">
   <p:cSld>
@@ -8150,7 +8803,7 @@
         <p:spPr>
           <a:xfrm>
             <a:off x="888459" y="1498542"/>
-            <a:ext cx="10006520" cy="2585323"/>
+            <a:ext cx="10006520" cy="2169825"/>
           </a:xfrm>
           <a:prstGeom prst="rect">
             <a:avLst/>
@@ -8175,14 +8828,6 @@
             </a:r>
           </a:p>
           <a:p>
-            <a:pPr>
-              <a:lnSpc>
-                <a:spcPct val="150000"/>
-              </a:lnSpc>
-            </a:pPr>
-            <a:endParaRPr lang="pt-BR" dirty="0"/>
-          </a:p>
-          <a:p>
             <a:pPr marL="285750" indent="-285750">
               <a:lnSpc>
                 <a:spcPct val="150000"/>
@@ -8234,6 +8879,36 @@
           </a:p>
         </p:txBody>
       </p:sp>
+      <p:pic>
+        <p:nvPicPr>
+          <p:cNvPr id="4" name="Picture 3">
+            <a:extLst>
+              <a:ext uri="{FF2B5EF4-FFF2-40B4-BE49-F238E27FC236}">
+                <a16:creationId xmlns:a16="http://schemas.microsoft.com/office/drawing/2014/main" id="{B2C5FB36-F9FF-4483-83A0-BB257FA63BA6}"/>
+              </a:ext>
+            </a:extLst>
+          </p:cNvPr>
+          <p:cNvPicPr>
+            <a:picLocks noChangeAspect="1"/>
+          </p:cNvPicPr>
+          <p:nvPr/>
+        </p:nvPicPr>
+        <p:blipFill>
+          <a:blip r:embed="rId3"/>
+          <a:stretch>
+            <a:fillRect/>
+          </a:stretch>
+        </p:blipFill>
+        <p:spPr>
+          <a:xfrm>
+            <a:off x="1281038" y="3830646"/>
+            <a:ext cx="4716487" cy="1699773"/>
+          </a:xfrm>
+          <a:prstGeom prst="rect">
+            <a:avLst/>
+          </a:prstGeom>
+        </p:spPr>
+      </p:pic>
     </p:spTree>
     <p:extLst>
       <p:ext uri="{BB962C8B-B14F-4D97-AF65-F5344CB8AC3E}">
@@ -9255,7 +9930,7 @@
         <p:spPr>
           <a:xfrm>
             <a:off x="888459" y="1498542"/>
-            <a:ext cx="10006520" cy="2169825"/>
+            <a:ext cx="10006520" cy="923330"/>
           </a:xfrm>
           <a:prstGeom prst="rect">
             <a:avLst/>
@@ -9276,7 +9951,7 @@
             </a:pPr>
             <a:r>
               <a:rPr lang="pt-BR" dirty="0"/>
-              <a:t>As rotas são definidas em uma tabela de definição de rotas que, na sua forma mais simples, contém um caminho e referência do componente;</a:t>
+              <a:t>São rotas que estão abaixo da Rota Principal</a:t>
             </a:r>
           </a:p>
           <a:p>
@@ -9289,48 +9964,41 @@
             </a:pPr>
             <a:r>
               <a:rPr lang="pt-BR" dirty="0"/>
-              <a:t>Os Components são carregados dentro do </a:t>
-            </a:r>
-            <a:r>
-              <a:rPr lang="pt-BR" b="1" dirty="0"/>
-              <a:t>&lt;router-outlet&gt;</a:t>
-            </a:r>
-            <a:r>
-              <a:rPr lang="pt-BR" dirty="0"/>
-              <a:t>;</a:t>
-            </a:r>
-          </a:p>
-          <a:p>
-            <a:pPr marL="285750" indent="-285750">
-              <a:lnSpc>
-                <a:spcPct val="150000"/>
-              </a:lnSpc>
-              <a:buFont typeface="Arial" panose="020B0604020202020204" pitchFamily="34" charset="0"/>
-              <a:buChar char="•"/>
-            </a:pPr>
-            <a:r>
-              <a:rPr lang="pt-BR" dirty="0"/>
-              <a:t>A navegação pode ser feita através da diretiva </a:t>
-            </a:r>
-            <a:r>
-              <a:rPr lang="pt-BR" b="1" dirty="0"/>
-              <a:t>[routerLink]</a:t>
-            </a:r>
-            <a:r>
-              <a:rPr lang="pt-BR" dirty="0"/>
-              <a:t> ou com o </a:t>
-            </a:r>
-            <a:r>
-              <a:rPr lang="pt-BR" b="1" dirty="0"/>
-              <a:t>router.navigation </a:t>
-            </a:r>
-            <a:r>
-              <a:rPr lang="pt-BR" dirty="0"/>
-              <a:t>do @angular/router e @angular/commom;</a:t>
-            </a:r>
-          </a:p>
-        </p:txBody>
-      </p:sp>
+              <a:t>Neste exemplo o curso e abaixo o novo curso.</a:t>
+            </a:r>
+          </a:p>
+        </p:txBody>
+      </p:sp>
+      <p:pic>
+        <p:nvPicPr>
+          <p:cNvPr id="6" name="Picture 5">
+            <a:extLst>
+              <a:ext uri="{FF2B5EF4-FFF2-40B4-BE49-F238E27FC236}">
+                <a16:creationId xmlns:a16="http://schemas.microsoft.com/office/drawing/2014/main" id="{A8F30109-3D4E-4D5E-82F2-783F6A34BB0A}"/>
+              </a:ext>
+            </a:extLst>
+          </p:cNvPr>
+          <p:cNvPicPr>
+            <a:picLocks noChangeAspect="1"/>
+          </p:cNvPicPr>
+          <p:nvPr/>
+        </p:nvPicPr>
+        <p:blipFill>
+          <a:blip r:embed="rId3"/>
+          <a:stretch>
+            <a:fillRect/>
+          </a:stretch>
+        </p:blipFill>
+        <p:spPr>
+          <a:xfrm>
+            <a:off x="3303125" y="2429929"/>
+            <a:ext cx="5585747" cy="2464300"/>
+          </a:xfrm>
+          <a:prstGeom prst="rect">
+            <a:avLst/>
+          </a:prstGeom>
+        </p:spPr>
+      </p:pic>
     </p:spTree>
     <p:extLst>
       <p:ext uri="{BB962C8B-B14F-4D97-AF65-F5344CB8AC3E}">
@@ -9465,8 +10133,8 @@
         </p:nvSpPr>
         <p:spPr>
           <a:xfrm>
-            <a:off x="888459" y="1498542"/>
-            <a:ext cx="10006520" cy="2169825"/>
+            <a:off x="860324" y="1233050"/>
+            <a:ext cx="10006520" cy="1338828"/>
           </a:xfrm>
           <a:prstGeom prst="rect">
             <a:avLst/>
@@ -9487,61 +10155,64 @@
             </a:pPr>
             <a:r>
               <a:rPr lang="pt-BR" dirty="0"/>
-              <a:t>As rotas são definidas em uma tabela de definição de rotas que, na sua forma mais simples, contém um caminho e referência do componente;</a:t>
-            </a:r>
-          </a:p>
-          <a:p>
-            <a:pPr marL="285750" indent="-285750">
+              <a:t>Vamos criar 2 componente, dentro do componente de curso</a:t>
+            </a:r>
+          </a:p>
+          <a:p>
+            <a:pPr>
               <a:lnSpc>
                 <a:spcPct val="150000"/>
               </a:lnSpc>
-              <a:buFont typeface="Arial" panose="020B0604020202020204" pitchFamily="34" charset="0"/>
-              <a:buChar char="•"/>
             </a:pPr>
             <a:r>
-              <a:rPr lang="pt-BR" dirty="0"/>
-              <a:t>Os Components são carregados dentro do </a:t>
-            </a:r>
-            <a:r>
               <a:rPr lang="pt-BR" b="1" dirty="0"/>
-              <a:t>&lt;router-outlet&gt;</a:t>
-            </a:r>
-            <a:r>
-              <a:rPr lang="pt-BR" dirty="0"/>
-              <a:t>;</a:t>
-            </a:r>
-          </a:p>
-          <a:p>
-            <a:pPr marL="285750" indent="-285750">
+              <a:t>     ng g c cursos/cursoForm --module app</a:t>
+            </a:r>
+          </a:p>
+          <a:p>
+            <a:pPr>
               <a:lnSpc>
                 <a:spcPct val="150000"/>
               </a:lnSpc>
-              <a:buFont typeface="Arial" panose="020B0604020202020204" pitchFamily="34" charset="0"/>
-              <a:buChar char="•"/>
             </a:pPr>
             <a:r>
-              <a:rPr lang="pt-BR" dirty="0"/>
-              <a:t>A navegação pode ser feita através da diretiva </a:t>
-            </a:r>
-            <a:r>
               <a:rPr lang="pt-BR" b="1" dirty="0"/>
-              <a:t>[routerLink]</a:t>
-            </a:r>
-            <a:r>
-              <a:rPr lang="pt-BR" dirty="0"/>
-              <a:t> ou com o </a:t>
-            </a:r>
-            <a:r>
-              <a:rPr lang="pt-BR" b="1" dirty="0"/>
-              <a:t>router.navigation </a:t>
-            </a:r>
-            <a:r>
-              <a:rPr lang="pt-BR" dirty="0"/>
-              <a:t>do @angular/router e @angular/commom;</a:t>
-            </a:r>
-          </a:p>
-        </p:txBody>
-      </p:sp>
+              <a:t>     ng g c cursos/cursoDetalhe --module app</a:t>
+            </a:r>
+            <a:endParaRPr lang="pt-BR" dirty="0"/>
+          </a:p>
+        </p:txBody>
+      </p:sp>
+      <p:pic>
+        <p:nvPicPr>
+          <p:cNvPr id="4" name="Picture 3">
+            <a:extLst>
+              <a:ext uri="{FF2B5EF4-FFF2-40B4-BE49-F238E27FC236}">
+                <a16:creationId xmlns:a16="http://schemas.microsoft.com/office/drawing/2014/main" id="{59C69690-944D-490A-B9C2-AC74DB6D48A6}"/>
+              </a:ext>
+            </a:extLst>
+          </p:cNvPr>
+          <p:cNvPicPr>
+            <a:picLocks noChangeAspect="1"/>
+          </p:cNvPicPr>
+          <p:nvPr/>
+        </p:nvPicPr>
+        <p:blipFill>
+          <a:blip r:embed="rId3"/>
+          <a:stretch>
+            <a:fillRect/>
+          </a:stretch>
+        </p:blipFill>
+        <p:spPr>
+          <a:xfrm>
+            <a:off x="4131614" y="2837370"/>
+            <a:ext cx="3928770" cy="3115044"/>
+          </a:xfrm>
+          <a:prstGeom prst="rect">
+            <a:avLst/>
+          </a:prstGeom>
+        </p:spPr>
+      </p:pic>
     </p:spTree>
     <p:extLst>
       <p:ext uri="{BB962C8B-B14F-4D97-AF65-F5344CB8AC3E}">
@@ -10825,21 +11496,6 @@
 </file>
 
 <file path=customXml/item1.xml><?xml version="1.0" encoding="utf-8"?>
-<?mso-contentType ?>
-<FormTemplates xmlns="http://schemas.microsoft.com/sharepoint/v3/contenttype/forms">
-  <Display>DocumentLibraryForm</Display>
-  <Edit>DocumentLibraryForm</Edit>
-  <New>DocumentLibraryForm</New>
-</FormTemplates>
-</file>
-
-<file path=customXml/item2.xml><?xml version="1.0" encoding="utf-8"?>
-<p:properties xmlns:p="http://schemas.microsoft.com/office/2006/metadata/properties" xmlns:xsi="http://www.w3.org/2001/XMLSchema-instance" xmlns:pc="http://schemas.microsoft.com/office/infopath/2007/PartnerControls">
-  <documentManagement/>
-</p:properties>
-</file>
-
-<file path=customXml/item3.xml><?xml version="1.0" encoding="utf-8"?>
 <ct:contentTypeSchema xmlns:ct="http://schemas.microsoft.com/office/2006/metadata/contentType" xmlns:ma="http://schemas.microsoft.com/office/2006/metadata/properties/metaAttributes" ct:_="" ma:_="" ma:contentTypeName="Documento" ma:contentTypeID="0x01010036D5650AA20B9C4994D4F61BF86E88A5" ma:contentTypeVersion="2" ma:contentTypeDescription="Crie um novo documento." ma:contentTypeScope="" ma:versionID="5e061fff1f46b9b376a7df479f71f8c8">
   <xsd:schema xmlns:xsd="http://www.w3.org/2001/XMLSchema" xmlns:xs="http://www.w3.org/2001/XMLSchema" xmlns:p="http://schemas.microsoft.com/office/2006/metadata/properties" xmlns:ns2="07a316ae-5687-4ea8-90ab-e5c6f194d564" targetNamespace="http://schemas.microsoft.com/office/2006/metadata/properties" ma:root="true" ma:fieldsID="fa601322723508fdb4fa44b47fe0f447" ns2:_="">
     <xsd:import namespace="07a316ae-5687-4ea8-90ab-e5c6f194d564"/>
@@ -10971,24 +11627,22 @@
 </ct:contentTypeSchema>
 </file>
 
-<file path=customXml/itemProps1.xml><?xml version="1.0" encoding="utf-8"?>
-<ds:datastoreItem xmlns:ds="http://schemas.openxmlformats.org/officeDocument/2006/customXml" ds:itemID="{CFC7BE12-D282-45D2-9360-ABE4B1901808}">
-  <ds:schemaRefs>
-    <ds:schemaRef ds:uri="http://schemas.microsoft.com/sharepoint/v3/contenttype/forms"/>
-  </ds:schemaRefs>
-</ds:datastoreItem>
+<file path=customXml/item2.xml><?xml version="1.0" encoding="utf-8"?>
+<p:properties xmlns:p="http://schemas.microsoft.com/office/2006/metadata/properties" xmlns:xsi="http://www.w3.org/2001/XMLSchema-instance" xmlns:pc="http://schemas.microsoft.com/office/infopath/2007/PartnerControls">
+  <documentManagement/>
+</p:properties>
 </file>
 
-<file path=customXml/itemProps2.xml><?xml version="1.0" encoding="utf-8"?>
-<ds:datastoreItem xmlns:ds="http://schemas.openxmlformats.org/officeDocument/2006/customXml" ds:itemID="{840916AD-EA36-4B19-B020-346B3B08ACE2}">
-  <ds:schemaRefs>
-    <ds:schemaRef ds:uri="http://schemas.microsoft.com/office/2006/metadata/properties"/>
-    <ds:schemaRef ds:uri="http://schemas.microsoft.com/office/infopath/2007/PartnerControls"/>
-  </ds:schemaRefs>
-</ds:datastoreItem>
+<file path=customXml/item3.xml><?xml version="1.0" encoding="utf-8"?>
+<?mso-contentType ?>
+<FormTemplates xmlns="http://schemas.microsoft.com/sharepoint/v3/contenttype/forms">
+  <Display>DocumentLibraryForm</Display>
+  <Edit>DocumentLibraryForm</Edit>
+  <New>DocumentLibraryForm</New>
+</FormTemplates>
 </file>
 
-<file path=customXml/itemProps3.xml><?xml version="1.0" encoding="utf-8"?>
+<file path=customXml/itemProps1.xml><?xml version="1.0" encoding="utf-8"?>
 <ds:datastoreItem xmlns:ds="http://schemas.openxmlformats.org/officeDocument/2006/customXml" ds:itemID="{971ED77C-6313-42D6-A059-131B9D4A2F34}">
   <ds:schemaRefs>
     <ds:schemaRef ds:uri="http://schemas.microsoft.com/office/2006/metadata/contentType"/>
@@ -11004,4 +11658,21 @@
     <ds:schemaRef ds:uri="http://schemas.microsoft.com/internal/obd"/>
   </ds:schemaRefs>
 </ds:datastoreItem>
+</file>
+
+<file path=customXml/itemProps2.xml><?xml version="1.0" encoding="utf-8"?>
+<ds:datastoreItem xmlns:ds="http://schemas.openxmlformats.org/officeDocument/2006/customXml" ds:itemID="{840916AD-EA36-4B19-B020-346B3B08ACE2}">
+  <ds:schemaRefs>
+    <ds:schemaRef ds:uri="http://schemas.microsoft.com/office/2006/metadata/properties"/>
+    <ds:schemaRef ds:uri="http://schemas.microsoft.com/office/infopath/2007/PartnerControls"/>
+  </ds:schemaRefs>
+</ds:datastoreItem>
+</file>
+
+<file path=customXml/itemProps3.xml><?xml version="1.0" encoding="utf-8"?>
+<ds:datastoreItem xmlns:ds="http://schemas.openxmlformats.org/officeDocument/2006/customXml" ds:itemID="{CFC7BE12-D282-45D2-9360-ABE4B1901808}">
+  <ds:schemaRefs>
+    <ds:schemaRef ds:uri="http://schemas.microsoft.com/sharepoint/v3/contenttype/forms"/>
+  </ds:schemaRefs>
+</ds:datastoreItem>
 </file>
</xml_diff>

<commit_message>
Lazy Loading - criacao do modulo e routing de cursos
</commit_message>
<xml_diff>
--- a/presentations/TreinamentoAngular.pptx
+++ b/presentations/TreinamentoAngular.pptx
@@ -9,7 +9,7 @@
     <p:sldMasterId id="2147483764" r:id="rId8"/>
   </p:sldMasterIdLst>
   <p:notesMasterIdLst>
-    <p:notesMasterId r:id="rId21"/>
+    <p:notesMasterId r:id="rId28"/>
   </p:notesMasterIdLst>
   <p:sldIdLst>
     <p:sldId id="314" r:id="rId9"/>
@@ -24,6 +24,13 @@
     <p:sldId id="325" r:id="rId18"/>
     <p:sldId id="326" r:id="rId19"/>
     <p:sldId id="327" r:id="rId20"/>
+    <p:sldId id="328" r:id="rId21"/>
+    <p:sldId id="329" r:id="rId22"/>
+    <p:sldId id="330" r:id="rId23"/>
+    <p:sldId id="331" r:id="rId24"/>
+    <p:sldId id="332" r:id="rId25"/>
+    <p:sldId id="333" r:id="rId26"/>
+    <p:sldId id="335" r:id="rId27"/>
   </p:sldIdLst>
   <p:sldSz cx="12192000" cy="6858000"/>
   <p:notesSz cx="6858000" cy="9144000"/>
@@ -139,6 +146,13 @@
             <p14:sldId id="325"/>
             <p14:sldId id="326"/>
             <p14:sldId id="327"/>
+            <p14:sldId id="328"/>
+            <p14:sldId id="329"/>
+            <p14:sldId id="330"/>
+            <p14:sldId id="331"/>
+            <p14:sldId id="332"/>
+            <p14:sldId id="333"/>
+            <p14:sldId id="335"/>
           </p14:sldIdLst>
         </p14:section>
         <p14:section name="Fim" id="{9EEAA474-718D-43F4-9556-5E5EAE13E381}">
@@ -250,7 +264,7 @@
           <a:p>
             <a:fld id="{1A323134-CEB1-9C43-B6DE-74B10BFB1C0A}" type="datetimeFigureOut">
               <a:rPr lang="en-US" smtClean="0"/>
-              <a:t>4/6/2018</a:t>
+              <a:t>4/7/2018</a:t>
             </a:fld>
             <a:endParaRPr lang="en-US"/>
           </a:p>
@@ -8461,6 +8475,1639 @@
     <p:extLst>
       <p:ext uri="{BB962C8B-B14F-4D97-AF65-F5344CB8AC3E}">
         <p14:creationId xmlns:p14="http://schemas.microsoft.com/office/powerpoint/2010/main" val="206163335"/>
+      </p:ext>
+    </p:extLst>
+  </p:cSld>
+  <p:clrMapOvr>
+    <a:masterClrMapping/>
+  </p:clrMapOvr>
+  <p:transition>
+    <p:fade/>
+  </p:transition>
+</p:sld>
+</file>
+
+<file path=ppt/slides/slide13.xml><?xml version="1.0" encoding="utf-8"?>
+<p:sld xmlns:a="http://schemas.openxmlformats.org/drawingml/2006/main" xmlns:r="http://schemas.openxmlformats.org/officeDocument/2006/relationships" xmlns:p="http://schemas.openxmlformats.org/presentationml/2006/main">
+  <p:cSld>
+    <p:spTree>
+      <p:nvGrpSpPr>
+        <p:cNvPr id="1" name=""/>
+        <p:cNvGrpSpPr/>
+        <p:nvPr/>
+      </p:nvGrpSpPr>
+      <p:grpSpPr>
+        <a:xfrm>
+          <a:off x="0" y="0"/>
+          <a:ext cx="0" cy="0"/>
+          <a:chOff x="0" y="0"/>
+          <a:chExt cx="0" cy="0"/>
+        </a:xfrm>
+      </p:grpSpPr>
+      <p:sp>
+        <p:nvSpPr>
+          <p:cNvPr id="2" name="Slide Number Placeholder 1"/>
+          <p:cNvSpPr>
+            <a:spLocks noGrp="1"/>
+          </p:cNvSpPr>
+          <p:nvPr>
+            <p:ph type="sldNum" sz="quarter" idx="12"/>
+          </p:nvPr>
+        </p:nvSpPr>
+        <p:spPr/>
+        <p:txBody>
+          <a:bodyPr/>
+          <a:lstStyle/>
+          <a:p>
+            <a:fld id="{3847DB54-D037-B84F-B6F1-2E8DA40D09AD}" type="slidenum">
+              <a:rPr lang="en-US" smtClean="0"/>
+              <a:pPr/>
+              <a:t>13</a:t>
+            </a:fld>
+            <a:endParaRPr lang="en-US"/>
+          </a:p>
+        </p:txBody>
+      </p:sp>
+      <p:sp>
+        <p:nvSpPr>
+          <p:cNvPr id="5" name="Title 4"/>
+          <p:cNvSpPr>
+            <a:spLocks noGrp="1"/>
+          </p:cNvSpPr>
+          <p:nvPr>
+            <p:ph type="title"/>
+          </p:nvPr>
+        </p:nvSpPr>
+        <p:spPr>
+          <a:xfrm>
+            <a:off x="960792" y="390719"/>
+            <a:ext cx="10270415" cy="834964"/>
+          </a:xfrm>
+        </p:spPr>
+        <p:txBody>
+          <a:bodyPr/>
+          <a:lstStyle/>
+          <a:p>
+            <a:r>
+              <a:rPr lang="pt-BR" dirty="0"/>
+              <a:t>Rotas – Lazy Loading - Definição</a:t>
+            </a:r>
+            <a:endParaRPr lang="en-US" dirty="0"/>
+          </a:p>
+        </p:txBody>
+      </p:sp>
+      <p:pic>
+        <p:nvPicPr>
+          <p:cNvPr id="9" name="Picture 2" descr="Resultado de imagem para angularjs logo"/>
+          <p:cNvPicPr>
+            <a:picLocks noChangeAspect="1" noChangeArrowheads="1"/>
+          </p:cNvPicPr>
+          <p:nvPr/>
+        </p:nvPicPr>
+        <p:blipFill>
+          <a:blip r:embed="rId2">
+            <a:extLst>
+              <a:ext uri="{28A0092B-C50C-407E-A947-70E740481C1C}">
+                <a14:useLocalDpi xmlns:a14="http://schemas.microsoft.com/office/drawing/2010/main" val="0"/>
+              </a:ext>
+            </a:extLst>
+          </a:blip>
+          <a:srcRect/>
+          <a:stretch>
+            <a:fillRect/>
+          </a:stretch>
+        </p:blipFill>
+        <p:spPr bwMode="auto">
+          <a:xfrm>
+            <a:off x="10415820" y="222684"/>
+            <a:ext cx="2126430" cy="1275858"/>
+          </a:xfrm>
+          <a:prstGeom prst="rect">
+            <a:avLst/>
+          </a:prstGeom>
+          <a:noFill/>
+          <a:extLst>
+            <a:ext uri="{909E8E84-426E-40DD-AFC4-6F175D3DCCD1}">
+              <a14:hiddenFill xmlns:a14="http://schemas.microsoft.com/office/drawing/2010/main">
+                <a:solidFill>
+                  <a:srgbClr val="FFFFFF"/>
+                </a:solidFill>
+              </a14:hiddenFill>
+            </a:ext>
+          </a:extLst>
+        </p:spPr>
+      </p:pic>
+      <p:sp>
+        <p:nvSpPr>
+          <p:cNvPr id="8" name="Rectangle 7">
+            <a:extLst>
+              <a:ext uri="{FF2B5EF4-FFF2-40B4-BE49-F238E27FC236}">
+                <a16:creationId xmlns:a16="http://schemas.microsoft.com/office/drawing/2014/main" id="{68905D47-4533-40E1-8BE3-F1630DC00262}"/>
+              </a:ext>
+            </a:extLst>
+          </p:cNvPr>
+          <p:cNvSpPr/>
+          <p:nvPr/>
+        </p:nvSpPr>
+        <p:spPr>
+          <a:xfrm>
+            <a:off x="960792" y="999750"/>
+            <a:ext cx="10574716" cy="923330"/>
+          </a:xfrm>
+          <a:prstGeom prst="rect">
+            <a:avLst/>
+          </a:prstGeom>
+        </p:spPr>
+        <p:txBody>
+          <a:bodyPr wrap="square">
+            <a:spAutoFit/>
+          </a:bodyPr>
+          <a:lstStyle/>
+          <a:p>
+            <a:pPr marL="285750" indent="-285750">
+              <a:lnSpc>
+                <a:spcPct val="150000"/>
+              </a:lnSpc>
+              <a:buFont typeface="Arial" panose="020B0604020202020204" pitchFamily="34" charset="0"/>
+              <a:buChar char="•"/>
+            </a:pPr>
+            <a:r>
+              <a:rPr lang="pt-BR" dirty="0"/>
+              <a:t>E o carregamento sob demanda para melhoria de perfomance da aplicação.</a:t>
+            </a:r>
+          </a:p>
+          <a:p>
+            <a:pPr marL="285750" indent="-285750">
+              <a:lnSpc>
+                <a:spcPct val="150000"/>
+              </a:lnSpc>
+              <a:buFont typeface="Arial" panose="020B0604020202020204" pitchFamily="34" charset="0"/>
+              <a:buChar char="•"/>
+            </a:pPr>
+            <a:r>
+              <a:rPr lang="pt-BR" dirty="0"/>
+              <a:t>A aplicação deve estar divida em modulo, pois quando navegar pela rota o modulo será carregado.</a:t>
+            </a:r>
+            <a:endParaRPr lang="pt-BR" b="1" dirty="0"/>
+          </a:p>
+        </p:txBody>
+      </p:sp>
+      <p:pic>
+        <p:nvPicPr>
+          <p:cNvPr id="12" name="Picture 11">
+            <a:extLst>
+              <a:ext uri="{FF2B5EF4-FFF2-40B4-BE49-F238E27FC236}">
+                <a16:creationId xmlns:a16="http://schemas.microsoft.com/office/drawing/2014/main" id="{1256D68F-4F42-49B4-8824-6BC73B608D3E}"/>
+              </a:ext>
+            </a:extLst>
+          </p:cNvPr>
+          <p:cNvPicPr>
+            <a:picLocks noChangeAspect="1"/>
+          </p:cNvPicPr>
+          <p:nvPr/>
+        </p:nvPicPr>
+        <p:blipFill>
+          <a:blip r:embed="rId3"/>
+          <a:stretch>
+            <a:fillRect/>
+          </a:stretch>
+        </p:blipFill>
+        <p:spPr>
+          <a:xfrm>
+            <a:off x="720749" y="1933855"/>
+            <a:ext cx="2619375" cy="1190625"/>
+          </a:xfrm>
+          <a:prstGeom prst="rect">
+            <a:avLst/>
+          </a:prstGeom>
+        </p:spPr>
+      </p:pic>
+      <p:pic>
+        <p:nvPicPr>
+          <p:cNvPr id="13" name="Picture 12">
+            <a:extLst>
+              <a:ext uri="{FF2B5EF4-FFF2-40B4-BE49-F238E27FC236}">
+                <a16:creationId xmlns:a16="http://schemas.microsoft.com/office/drawing/2014/main" id="{D57B2D3A-8F9D-4FA4-8EA4-853316397A7A}"/>
+              </a:ext>
+            </a:extLst>
+          </p:cNvPr>
+          <p:cNvPicPr>
+            <a:picLocks noChangeAspect="1"/>
+          </p:cNvPicPr>
+          <p:nvPr/>
+        </p:nvPicPr>
+        <p:blipFill>
+          <a:blip r:embed="rId4"/>
+          <a:stretch>
+            <a:fillRect/>
+          </a:stretch>
+        </p:blipFill>
+        <p:spPr>
+          <a:xfrm>
+            <a:off x="720749" y="4804337"/>
+            <a:ext cx="2790825" cy="1152525"/>
+          </a:xfrm>
+          <a:prstGeom prst="rect">
+            <a:avLst/>
+          </a:prstGeom>
+        </p:spPr>
+      </p:pic>
+      <p:pic>
+        <p:nvPicPr>
+          <p:cNvPr id="14" name="Picture 13">
+            <a:extLst>
+              <a:ext uri="{FF2B5EF4-FFF2-40B4-BE49-F238E27FC236}">
+                <a16:creationId xmlns:a16="http://schemas.microsoft.com/office/drawing/2014/main" id="{5391DD4F-A777-42DF-9BD8-A530AF780826}"/>
+              </a:ext>
+            </a:extLst>
+          </p:cNvPr>
+          <p:cNvPicPr>
+            <a:picLocks noChangeAspect="1"/>
+          </p:cNvPicPr>
+          <p:nvPr/>
+        </p:nvPicPr>
+        <p:blipFill>
+          <a:blip r:embed="rId5"/>
+          <a:stretch>
+            <a:fillRect/>
+          </a:stretch>
+        </p:blipFill>
+        <p:spPr>
+          <a:xfrm>
+            <a:off x="685550" y="3023850"/>
+            <a:ext cx="11125200" cy="1495425"/>
+          </a:xfrm>
+          <a:prstGeom prst="rect">
+            <a:avLst/>
+          </a:prstGeom>
+        </p:spPr>
+      </p:pic>
+      <p:pic>
+        <p:nvPicPr>
+          <p:cNvPr id="15" name="Picture 14">
+            <a:extLst>
+              <a:ext uri="{FF2B5EF4-FFF2-40B4-BE49-F238E27FC236}">
+                <a16:creationId xmlns:a16="http://schemas.microsoft.com/office/drawing/2014/main" id="{BBB6756F-6E22-4F9D-B032-362B3D3D5123}"/>
+              </a:ext>
+            </a:extLst>
+          </p:cNvPr>
+          <p:cNvPicPr>
+            <a:picLocks noChangeAspect="1"/>
+          </p:cNvPicPr>
+          <p:nvPr/>
+        </p:nvPicPr>
+        <p:blipFill>
+          <a:blip r:embed="rId6"/>
+          <a:stretch>
+            <a:fillRect/>
+          </a:stretch>
+        </p:blipFill>
+        <p:spPr>
+          <a:xfrm>
+            <a:off x="685550" y="5947955"/>
+            <a:ext cx="11125200" cy="266700"/>
+          </a:xfrm>
+          <a:prstGeom prst="rect">
+            <a:avLst/>
+          </a:prstGeom>
+        </p:spPr>
+      </p:pic>
+    </p:spTree>
+    <p:extLst>
+      <p:ext uri="{BB962C8B-B14F-4D97-AF65-F5344CB8AC3E}">
+        <p14:creationId xmlns:p14="http://schemas.microsoft.com/office/powerpoint/2010/main" val="4243781344"/>
+      </p:ext>
+    </p:extLst>
+  </p:cSld>
+  <p:clrMapOvr>
+    <a:masterClrMapping/>
+  </p:clrMapOvr>
+  <p:transition>
+    <p:fade/>
+  </p:transition>
+</p:sld>
+</file>
+
+<file path=ppt/slides/slide14.xml><?xml version="1.0" encoding="utf-8"?>
+<p:sld xmlns:a="http://schemas.openxmlformats.org/drawingml/2006/main" xmlns:r="http://schemas.openxmlformats.org/officeDocument/2006/relationships" xmlns:p="http://schemas.openxmlformats.org/presentationml/2006/main">
+  <p:cSld>
+    <p:spTree>
+      <p:nvGrpSpPr>
+        <p:cNvPr id="1" name=""/>
+        <p:cNvGrpSpPr/>
+        <p:nvPr/>
+      </p:nvGrpSpPr>
+      <p:grpSpPr>
+        <a:xfrm>
+          <a:off x="0" y="0"/>
+          <a:ext cx="0" cy="0"/>
+          <a:chOff x="0" y="0"/>
+          <a:chExt cx="0" cy="0"/>
+        </a:xfrm>
+      </p:grpSpPr>
+      <p:sp>
+        <p:nvSpPr>
+          <p:cNvPr id="2" name="Slide Number Placeholder 1"/>
+          <p:cNvSpPr>
+            <a:spLocks noGrp="1"/>
+          </p:cNvSpPr>
+          <p:nvPr>
+            <p:ph type="sldNum" sz="quarter" idx="12"/>
+          </p:nvPr>
+        </p:nvSpPr>
+        <p:spPr/>
+        <p:txBody>
+          <a:bodyPr/>
+          <a:lstStyle/>
+          <a:p>
+            <a:fld id="{3847DB54-D037-B84F-B6F1-2E8DA40D09AD}" type="slidenum">
+              <a:rPr lang="en-US" smtClean="0"/>
+              <a:pPr/>
+              <a:t>14</a:t>
+            </a:fld>
+            <a:endParaRPr lang="en-US"/>
+          </a:p>
+        </p:txBody>
+      </p:sp>
+      <p:sp>
+        <p:nvSpPr>
+          <p:cNvPr id="5" name="Title 4"/>
+          <p:cNvSpPr>
+            <a:spLocks noGrp="1"/>
+          </p:cNvSpPr>
+          <p:nvPr>
+            <p:ph type="title"/>
+          </p:nvPr>
+        </p:nvSpPr>
+        <p:spPr>
+          <a:xfrm>
+            <a:off x="960792" y="390719"/>
+            <a:ext cx="10270415" cy="834964"/>
+          </a:xfrm>
+        </p:spPr>
+        <p:txBody>
+          <a:bodyPr/>
+          <a:lstStyle/>
+          <a:p>
+            <a:r>
+              <a:rPr lang="pt-BR" dirty="0"/>
+              <a:t>Rotas – Lazy Loading </a:t>
+            </a:r>
+            <a:endParaRPr lang="en-US" dirty="0"/>
+          </a:p>
+        </p:txBody>
+      </p:sp>
+      <p:pic>
+        <p:nvPicPr>
+          <p:cNvPr id="9" name="Picture 2" descr="Resultado de imagem para angularjs logo"/>
+          <p:cNvPicPr>
+            <a:picLocks noChangeAspect="1" noChangeArrowheads="1"/>
+          </p:cNvPicPr>
+          <p:nvPr/>
+        </p:nvPicPr>
+        <p:blipFill>
+          <a:blip r:embed="rId2">
+            <a:extLst>
+              <a:ext uri="{28A0092B-C50C-407E-A947-70E740481C1C}">
+                <a14:useLocalDpi xmlns:a14="http://schemas.microsoft.com/office/drawing/2010/main" val="0"/>
+              </a:ext>
+            </a:extLst>
+          </a:blip>
+          <a:srcRect/>
+          <a:stretch>
+            <a:fillRect/>
+          </a:stretch>
+        </p:blipFill>
+        <p:spPr bwMode="auto">
+          <a:xfrm>
+            <a:off x="10415820" y="222684"/>
+            <a:ext cx="2126430" cy="1275858"/>
+          </a:xfrm>
+          <a:prstGeom prst="rect">
+            <a:avLst/>
+          </a:prstGeom>
+          <a:noFill/>
+          <a:extLst>
+            <a:ext uri="{909E8E84-426E-40DD-AFC4-6F175D3DCCD1}">
+              <a14:hiddenFill xmlns:a14="http://schemas.microsoft.com/office/drawing/2010/main">
+                <a:solidFill>
+                  <a:srgbClr val="FFFFFF"/>
+                </a:solidFill>
+              </a14:hiddenFill>
+            </a:ext>
+          </a:extLst>
+        </p:spPr>
+      </p:pic>
+      <p:sp>
+        <p:nvSpPr>
+          <p:cNvPr id="8" name="Rectangle 7">
+            <a:extLst>
+              <a:ext uri="{FF2B5EF4-FFF2-40B4-BE49-F238E27FC236}">
+                <a16:creationId xmlns:a16="http://schemas.microsoft.com/office/drawing/2014/main" id="{68905D47-4533-40E1-8BE3-F1630DC00262}"/>
+              </a:ext>
+            </a:extLst>
+          </p:cNvPr>
+          <p:cNvSpPr/>
+          <p:nvPr/>
+        </p:nvSpPr>
+        <p:spPr>
+          <a:xfrm>
+            <a:off x="960792" y="1036877"/>
+            <a:ext cx="10006520" cy="1338828"/>
+          </a:xfrm>
+          <a:prstGeom prst="rect">
+            <a:avLst/>
+          </a:prstGeom>
+        </p:spPr>
+        <p:txBody>
+          <a:bodyPr wrap="square">
+            <a:spAutoFit/>
+          </a:bodyPr>
+          <a:lstStyle/>
+          <a:p>
+            <a:pPr marL="285750" indent="-285750">
+              <a:lnSpc>
+                <a:spcPct val="150000"/>
+              </a:lnSpc>
+              <a:buFont typeface="Arial" panose="020B0604020202020204" pitchFamily="34" charset="0"/>
+              <a:buChar char="•"/>
+            </a:pPr>
+            <a:r>
+              <a:rPr lang="pt-BR" dirty="0"/>
+              <a:t>Vamos começar fazendo os componentes de curso se tornarem um modulo. </a:t>
+            </a:r>
+          </a:p>
+          <a:p>
+            <a:pPr marL="285750" indent="-285750">
+              <a:lnSpc>
+                <a:spcPct val="150000"/>
+              </a:lnSpc>
+              <a:buFont typeface="Arial" panose="020B0604020202020204" pitchFamily="34" charset="0"/>
+              <a:buChar char="•"/>
+            </a:pPr>
+            <a:r>
+              <a:rPr lang="pt-BR" dirty="0"/>
+              <a:t>Também é necessario criar um arquivo de rotas para o curso</a:t>
+            </a:r>
+          </a:p>
+          <a:p>
+            <a:pPr>
+              <a:lnSpc>
+                <a:spcPct val="150000"/>
+              </a:lnSpc>
+            </a:pPr>
+            <a:r>
+              <a:rPr lang="pt-BR" b="1" dirty="0"/>
+              <a:t>     ng g m cursos --routing</a:t>
+            </a:r>
+          </a:p>
+        </p:txBody>
+      </p:sp>
+      <p:pic>
+        <p:nvPicPr>
+          <p:cNvPr id="12" name="Picture 11">
+            <a:extLst>
+              <a:ext uri="{FF2B5EF4-FFF2-40B4-BE49-F238E27FC236}">
+                <a16:creationId xmlns:a16="http://schemas.microsoft.com/office/drawing/2014/main" id="{42CEB1AD-BA97-46F6-A071-2A98D7337436}"/>
+              </a:ext>
+            </a:extLst>
+          </p:cNvPr>
+          <p:cNvPicPr>
+            <a:picLocks noChangeAspect="1"/>
+          </p:cNvPicPr>
+          <p:nvPr/>
+        </p:nvPicPr>
+        <p:blipFill>
+          <a:blip r:embed="rId3"/>
+          <a:stretch>
+            <a:fillRect/>
+          </a:stretch>
+        </p:blipFill>
+        <p:spPr>
+          <a:xfrm>
+            <a:off x="2917653" y="2375705"/>
+            <a:ext cx="2924175" cy="3819525"/>
+          </a:xfrm>
+          <a:prstGeom prst="rect">
+            <a:avLst/>
+          </a:prstGeom>
+        </p:spPr>
+      </p:pic>
+    </p:spTree>
+    <p:extLst>
+      <p:ext uri="{BB962C8B-B14F-4D97-AF65-F5344CB8AC3E}">
+        <p14:creationId xmlns:p14="http://schemas.microsoft.com/office/powerpoint/2010/main" val="3793358693"/>
+      </p:ext>
+    </p:extLst>
+  </p:cSld>
+  <p:clrMapOvr>
+    <a:masterClrMapping/>
+  </p:clrMapOvr>
+  <p:transition>
+    <p:fade/>
+  </p:transition>
+</p:sld>
+</file>
+
+<file path=ppt/slides/slide15.xml><?xml version="1.0" encoding="utf-8"?>
+<p:sld xmlns:a="http://schemas.openxmlformats.org/drawingml/2006/main" xmlns:r="http://schemas.openxmlformats.org/officeDocument/2006/relationships" xmlns:p="http://schemas.openxmlformats.org/presentationml/2006/main">
+  <p:cSld>
+    <p:spTree>
+      <p:nvGrpSpPr>
+        <p:cNvPr id="1" name=""/>
+        <p:cNvGrpSpPr/>
+        <p:nvPr/>
+      </p:nvGrpSpPr>
+      <p:grpSpPr>
+        <a:xfrm>
+          <a:off x="0" y="0"/>
+          <a:ext cx="0" cy="0"/>
+          <a:chOff x="0" y="0"/>
+          <a:chExt cx="0" cy="0"/>
+        </a:xfrm>
+      </p:grpSpPr>
+      <p:sp>
+        <p:nvSpPr>
+          <p:cNvPr id="2" name="Slide Number Placeholder 1"/>
+          <p:cNvSpPr>
+            <a:spLocks noGrp="1"/>
+          </p:cNvSpPr>
+          <p:nvPr>
+            <p:ph type="sldNum" sz="quarter" idx="12"/>
+          </p:nvPr>
+        </p:nvSpPr>
+        <p:spPr/>
+        <p:txBody>
+          <a:bodyPr/>
+          <a:lstStyle/>
+          <a:p>
+            <a:fld id="{3847DB54-D037-B84F-B6F1-2E8DA40D09AD}" type="slidenum">
+              <a:rPr lang="en-US" smtClean="0"/>
+              <a:pPr/>
+              <a:t>15</a:t>
+            </a:fld>
+            <a:endParaRPr lang="en-US"/>
+          </a:p>
+        </p:txBody>
+      </p:sp>
+      <p:sp>
+        <p:nvSpPr>
+          <p:cNvPr id="5" name="Title 4"/>
+          <p:cNvSpPr>
+            <a:spLocks noGrp="1"/>
+          </p:cNvSpPr>
+          <p:nvPr>
+            <p:ph type="title"/>
+          </p:nvPr>
+        </p:nvSpPr>
+        <p:spPr>
+          <a:xfrm>
+            <a:off x="960792" y="390719"/>
+            <a:ext cx="10270415" cy="834964"/>
+          </a:xfrm>
+        </p:spPr>
+        <p:txBody>
+          <a:bodyPr/>
+          <a:lstStyle/>
+          <a:p>
+            <a:r>
+              <a:rPr lang="pt-BR" dirty="0"/>
+              <a:t>Rotas – Lazy Loading</a:t>
+            </a:r>
+            <a:endParaRPr lang="en-US" dirty="0"/>
+          </a:p>
+        </p:txBody>
+      </p:sp>
+      <p:pic>
+        <p:nvPicPr>
+          <p:cNvPr id="9" name="Picture 2" descr="Resultado de imagem para angularjs logo"/>
+          <p:cNvPicPr>
+            <a:picLocks noChangeAspect="1" noChangeArrowheads="1"/>
+          </p:cNvPicPr>
+          <p:nvPr/>
+        </p:nvPicPr>
+        <p:blipFill>
+          <a:blip r:embed="rId2">
+            <a:extLst>
+              <a:ext uri="{28A0092B-C50C-407E-A947-70E740481C1C}">
+                <a14:useLocalDpi xmlns:a14="http://schemas.microsoft.com/office/drawing/2010/main" val="0"/>
+              </a:ext>
+            </a:extLst>
+          </a:blip>
+          <a:srcRect/>
+          <a:stretch>
+            <a:fillRect/>
+          </a:stretch>
+        </p:blipFill>
+        <p:spPr bwMode="auto">
+          <a:xfrm>
+            <a:off x="10415820" y="222684"/>
+            <a:ext cx="2126430" cy="1275858"/>
+          </a:xfrm>
+          <a:prstGeom prst="rect">
+            <a:avLst/>
+          </a:prstGeom>
+          <a:noFill/>
+          <a:extLst>
+            <a:ext uri="{909E8E84-426E-40DD-AFC4-6F175D3DCCD1}">
+              <a14:hiddenFill xmlns:a14="http://schemas.microsoft.com/office/drawing/2010/main">
+                <a:solidFill>
+                  <a:srgbClr val="FFFFFF"/>
+                </a:solidFill>
+              </a14:hiddenFill>
+            </a:ext>
+          </a:extLst>
+        </p:spPr>
+      </p:pic>
+      <p:sp>
+        <p:nvSpPr>
+          <p:cNvPr id="10" name="Rectangle 9">
+            <a:extLst>
+              <a:ext uri="{FF2B5EF4-FFF2-40B4-BE49-F238E27FC236}">
+                <a16:creationId xmlns:a16="http://schemas.microsoft.com/office/drawing/2014/main" id="{429079B8-08FB-4829-B5FD-0CE4BBAFCC70}"/>
+              </a:ext>
+            </a:extLst>
+          </p:cNvPr>
+          <p:cNvSpPr/>
+          <p:nvPr/>
+        </p:nvSpPr>
+        <p:spPr>
+          <a:xfrm>
+            <a:off x="983438" y="990711"/>
+            <a:ext cx="9665805" cy="923330"/>
+          </a:xfrm>
+          <a:prstGeom prst="rect">
+            <a:avLst/>
+          </a:prstGeom>
+        </p:spPr>
+        <p:txBody>
+          <a:bodyPr wrap="square">
+            <a:spAutoFit/>
+          </a:bodyPr>
+          <a:lstStyle/>
+          <a:p>
+            <a:pPr marL="285750" indent="-285750">
+              <a:lnSpc>
+                <a:spcPct val="150000"/>
+              </a:lnSpc>
+              <a:buFont typeface="Arial" panose="020B0604020202020204" pitchFamily="34" charset="0"/>
+              <a:buChar char="•"/>
+            </a:pPr>
+            <a:r>
+              <a:rPr lang="pt-BR" dirty="0"/>
+              <a:t>Alterar o </a:t>
+            </a:r>
+            <a:r>
+              <a:rPr lang="pt-BR" b="1" dirty="0"/>
+              <a:t>cursos.module.ts </a:t>
+            </a:r>
+            <a:r>
+              <a:rPr lang="pt-BR" dirty="0"/>
+              <a:t>Incluindo os componentes do curso e referenciado </a:t>
+            </a:r>
+            <a:r>
+              <a:rPr lang="pt-BR" b="1" dirty="0"/>
+              <a:t>CursosRountingModule</a:t>
+            </a:r>
+          </a:p>
+        </p:txBody>
+      </p:sp>
+      <p:pic>
+        <p:nvPicPr>
+          <p:cNvPr id="4" name="Picture 3">
+            <a:extLst>
+              <a:ext uri="{FF2B5EF4-FFF2-40B4-BE49-F238E27FC236}">
+                <a16:creationId xmlns:a16="http://schemas.microsoft.com/office/drawing/2014/main" id="{DD5FEEDD-5447-42CD-B8EA-AC29CFFF2859}"/>
+              </a:ext>
+            </a:extLst>
+          </p:cNvPr>
+          <p:cNvPicPr>
+            <a:picLocks noChangeAspect="1"/>
+          </p:cNvPicPr>
+          <p:nvPr/>
+        </p:nvPicPr>
+        <p:blipFill>
+          <a:blip r:embed="rId3"/>
+          <a:stretch>
+            <a:fillRect/>
+          </a:stretch>
+        </p:blipFill>
+        <p:spPr>
+          <a:xfrm>
+            <a:off x="2357951" y="2013720"/>
+            <a:ext cx="6800850" cy="3914775"/>
+          </a:xfrm>
+          <a:prstGeom prst="rect">
+            <a:avLst/>
+          </a:prstGeom>
+        </p:spPr>
+      </p:pic>
+    </p:spTree>
+    <p:extLst>
+      <p:ext uri="{BB962C8B-B14F-4D97-AF65-F5344CB8AC3E}">
+        <p14:creationId xmlns:p14="http://schemas.microsoft.com/office/powerpoint/2010/main" val="2938453674"/>
+      </p:ext>
+    </p:extLst>
+  </p:cSld>
+  <p:clrMapOvr>
+    <a:masterClrMapping/>
+  </p:clrMapOvr>
+  <p:transition>
+    <p:fade/>
+  </p:transition>
+</p:sld>
+</file>
+
+<file path=ppt/slides/slide16.xml><?xml version="1.0" encoding="utf-8"?>
+<p:sld xmlns:a="http://schemas.openxmlformats.org/drawingml/2006/main" xmlns:r="http://schemas.openxmlformats.org/officeDocument/2006/relationships" xmlns:p="http://schemas.openxmlformats.org/presentationml/2006/main">
+  <p:cSld>
+    <p:spTree>
+      <p:nvGrpSpPr>
+        <p:cNvPr id="1" name=""/>
+        <p:cNvGrpSpPr/>
+        <p:nvPr/>
+      </p:nvGrpSpPr>
+      <p:grpSpPr>
+        <a:xfrm>
+          <a:off x="0" y="0"/>
+          <a:ext cx="0" cy="0"/>
+          <a:chOff x="0" y="0"/>
+          <a:chExt cx="0" cy="0"/>
+        </a:xfrm>
+      </p:grpSpPr>
+      <p:sp>
+        <p:nvSpPr>
+          <p:cNvPr id="2" name="Slide Number Placeholder 1"/>
+          <p:cNvSpPr>
+            <a:spLocks noGrp="1"/>
+          </p:cNvSpPr>
+          <p:nvPr>
+            <p:ph type="sldNum" sz="quarter" idx="12"/>
+          </p:nvPr>
+        </p:nvSpPr>
+        <p:spPr/>
+        <p:txBody>
+          <a:bodyPr/>
+          <a:lstStyle/>
+          <a:p>
+            <a:fld id="{3847DB54-D037-B84F-B6F1-2E8DA40D09AD}" type="slidenum">
+              <a:rPr lang="en-US" smtClean="0"/>
+              <a:pPr/>
+              <a:t>16</a:t>
+            </a:fld>
+            <a:endParaRPr lang="en-US"/>
+          </a:p>
+        </p:txBody>
+      </p:sp>
+      <p:sp>
+        <p:nvSpPr>
+          <p:cNvPr id="5" name="Title 4"/>
+          <p:cNvSpPr>
+            <a:spLocks noGrp="1"/>
+          </p:cNvSpPr>
+          <p:nvPr>
+            <p:ph type="title"/>
+          </p:nvPr>
+        </p:nvSpPr>
+        <p:spPr>
+          <a:xfrm>
+            <a:off x="960792" y="390719"/>
+            <a:ext cx="10270415" cy="834964"/>
+          </a:xfrm>
+        </p:spPr>
+        <p:txBody>
+          <a:bodyPr/>
+          <a:lstStyle/>
+          <a:p>
+            <a:r>
+              <a:rPr lang="pt-BR" dirty="0"/>
+              <a:t>Rotas – Lazy Loading</a:t>
+            </a:r>
+            <a:endParaRPr lang="en-US" dirty="0"/>
+          </a:p>
+        </p:txBody>
+      </p:sp>
+      <p:pic>
+        <p:nvPicPr>
+          <p:cNvPr id="9" name="Picture 2" descr="Resultado de imagem para angularjs logo"/>
+          <p:cNvPicPr>
+            <a:picLocks noChangeAspect="1" noChangeArrowheads="1"/>
+          </p:cNvPicPr>
+          <p:nvPr/>
+        </p:nvPicPr>
+        <p:blipFill>
+          <a:blip r:embed="rId2">
+            <a:extLst>
+              <a:ext uri="{28A0092B-C50C-407E-A947-70E740481C1C}">
+                <a14:useLocalDpi xmlns:a14="http://schemas.microsoft.com/office/drawing/2010/main" val="0"/>
+              </a:ext>
+            </a:extLst>
+          </a:blip>
+          <a:srcRect/>
+          <a:stretch>
+            <a:fillRect/>
+          </a:stretch>
+        </p:blipFill>
+        <p:spPr bwMode="auto">
+          <a:xfrm>
+            <a:off x="10415820" y="222684"/>
+            <a:ext cx="2126430" cy="1275858"/>
+          </a:xfrm>
+          <a:prstGeom prst="rect">
+            <a:avLst/>
+          </a:prstGeom>
+          <a:noFill/>
+          <a:extLst>
+            <a:ext uri="{909E8E84-426E-40DD-AFC4-6F175D3DCCD1}">
+              <a14:hiddenFill xmlns:a14="http://schemas.microsoft.com/office/drawing/2010/main">
+                <a:solidFill>
+                  <a:srgbClr val="FFFFFF"/>
+                </a:solidFill>
+              </a14:hiddenFill>
+            </a:ext>
+          </a:extLst>
+        </p:spPr>
+      </p:pic>
+      <p:sp>
+        <p:nvSpPr>
+          <p:cNvPr id="10" name="Rectangle 9">
+            <a:extLst>
+              <a:ext uri="{FF2B5EF4-FFF2-40B4-BE49-F238E27FC236}">
+                <a16:creationId xmlns:a16="http://schemas.microsoft.com/office/drawing/2014/main" id="{429079B8-08FB-4829-B5FD-0CE4BBAFCC70}"/>
+              </a:ext>
+            </a:extLst>
+          </p:cNvPr>
+          <p:cNvSpPr/>
+          <p:nvPr/>
+        </p:nvSpPr>
+        <p:spPr>
+          <a:xfrm>
+            <a:off x="960792" y="994742"/>
+            <a:ext cx="10006520" cy="923330"/>
+          </a:xfrm>
+          <a:prstGeom prst="rect">
+            <a:avLst/>
+          </a:prstGeom>
+        </p:spPr>
+        <p:txBody>
+          <a:bodyPr wrap="square">
+            <a:spAutoFit/>
+          </a:bodyPr>
+          <a:lstStyle/>
+          <a:p>
+            <a:pPr marL="285750" indent="-285750">
+              <a:lnSpc>
+                <a:spcPct val="150000"/>
+              </a:lnSpc>
+              <a:buFont typeface="Arial" panose="020B0604020202020204" pitchFamily="34" charset="0"/>
+              <a:buChar char="•"/>
+            </a:pPr>
+            <a:r>
+              <a:rPr lang="pt-BR" dirty="0"/>
+              <a:t>O modulo principal (</a:t>
+            </a:r>
+            <a:r>
+              <a:rPr lang="pt-BR" b="1" dirty="0"/>
+              <a:t>app.module.ts</a:t>
+            </a:r>
+            <a:r>
+              <a:rPr lang="pt-BR" dirty="0"/>
+              <a:t>) também deve ser alterado, removendo os componentes de curso</a:t>
+            </a:r>
+          </a:p>
+        </p:txBody>
+      </p:sp>
+      <p:pic>
+        <p:nvPicPr>
+          <p:cNvPr id="3" name="Picture 2">
+            <a:extLst>
+              <a:ext uri="{FF2B5EF4-FFF2-40B4-BE49-F238E27FC236}">
+                <a16:creationId xmlns:a16="http://schemas.microsoft.com/office/drawing/2014/main" id="{EE6D32CD-AD9F-4D51-81C1-F87EBF36FD6E}"/>
+              </a:ext>
+            </a:extLst>
+          </p:cNvPr>
+          <p:cNvPicPr>
+            <a:picLocks noChangeAspect="1"/>
+          </p:cNvPicPr>
+          <p:nvPr/>
+        </p:nvPicPr>
+        <p:blipFill>
+          <a:blip r:embed="rId3"/>
+          <a:stretch>
+            <a:fillRect/>
+          </a:stretch>
+        </p:blipFill>
+        <p:spPr>
+          <a:xfrm>
+            <a:off x="2855372" y="1590315"/>
+            <a:ext cx="5495925" cy="4791075"/>
+          </a:xfrm>
+          <a:prstGeom prst="rect">
+            <a:avLst/>
+          </a:prstGeom>
+        </p:spPr>
+      </p:pic>
+    </p:spTree>
+    <p:extLst>
+      <p:ext uri="{BB962C8B-B14F-4D97-AF65-F5344CB8AC3E}">
+        <p14:creationId xmlns:p14="http://schemas.microsoft.com/office/powerpoint/2010/main" val="2210038351"/>
+      </p:ext>
+    </p:extLst>
+  </p:cSld>
+  <p:clrMapOvr>
+    <a:masterClrMapping/>
+  </p:clrMapOvr>
+  <p:transition>
+    <p:fade/>
+  </p:transition>
+</p:sld>
+</file>
+
+<file path=ppt/slides/slide17.xml><?xml version="1.0" encoding="utf-8"?>
+<p:sld xmlns:a="http://schemas.openxmlformats.org/drawingml/2006/main" xmlns:r="http://schemas.openxmlformats.org/officeDocument/2006/relationships" xmlns:p="http://schemas.openxmlformats.org/presentationml/2006/main">
+  <p:cSld>
+    <p:spTree>
+      <p:nvGrpSpPr>
+        <p:cNvPr id="1" name=""/>
+        <p:cNvGrpSpPr/>
+        <p:nvPr/>
+      </p:nvGrpSpPr>
+      <p:grpSpPr>
+        <a:xfrm>
+          <a:off x="0" y="0"/>
+          <a:ext cx="0" cy="0"/>
+          <a:chOff x="0" y="0"/>
+          <a:chExt cx="0" cy="0"/>
+        </a:xfrm>
+      </p:grpSpPr>
+      <p:sp>
+        <p:nvSpPr>
+          <p:cNvPr id="2" name="Slide Number Placeholder 1"/>
+          <p:cNvSpPr>
+            <a:spLocks noGrp="1"/>
+          </p:cNvSpPr>
+          <p:nvPr>
+            <p:ph type="sldNum" sz="quarter" idx="12"/>
+          </p:nvPr>
+        </p:nvSpPr>
+        <p:spPr/>
+        <p:txBody>
+          <a:bodyPr/>
+          <a:lstStyle/>
+          <a:p>
+            <a:fld id="{3847DB54-D037-B84F-B6F1-2E8DA40D09AD}" type="slidenum">
+              <a:rPr lang="en-US" smtClean="0"/>
+              <a:pPr/>
+              <a:t>17</a:t>
+            </a:fld>
+            <a:endParaRPr lang="en-US"/>
+          </a:p>
+        </p:txBody>
+      </p:sp>
+      <p:sp>
+        <p:nvSpPr>
+          <p:cNvPr id="5" name="Title 4"/>
+          <p:cNvSpPr>
+            <a:spLocks noGrp="1"/>
+          </p:cNvSpPr>
+          <p:nvPr>
+            <p:ph type="title"/>
+          </p:nvPr>
+        </p:nvSpPr>
+        <p:spPr>
+          <a:xfrm>
+            <a:off x="960792" y="390719"/>
+            <a:ext cx="10270415" cy="834964"/>
+          </a:xfrm>
+        </p:spPr>
+        <p:txBody>
+          <a:bodyPr/>
+          <a:lstStyle/>
+          <a:p>
+            <a:r>
+              <a:rPr lang="pt-BR" dirty="0"/>
+              <a:t>Rotas – Lazy Loading</a:t>
+            </a:r>
+            <a:endParaRPr lang="en-US" dirty="0"/>
+          </a:p>
+        </p:txBody>
+      </p:sp>
+      <p:pic>
+        <p:nvPicPr>
+          <p:cNvPr id="9" name="Picture 2" descr="Resultado de imagem para angularjs logo"/>
+          <p:cNvPicPr>
+            <a:picLocks noChangeAspect="1" noChangeArrowheads="1"/>
+          </p:cNvPicPr>
+          <p:nvPr/>
+        </p:nvPicPr>
+        <p:blipFill>
+          <a:blip r:embed="rId2">
+            <a:extLst>
+              <a:ext uri="{28A0092B-C50C-407E-A947-70E740481C1C}">
+                <a14:useLocalDpi xmlns:a14="http://schemas.microsoft.com/office/drawing/2010/main" val="0"/>
+              </a:ext>
+            </a:extLst>
+          </a:blip>
+          <a:srcRect/>
+          <a:stretch>
+            <a:fillRect/>
+          </a:stretch>
+        </p:blipFill>
+        <p:spPr bwMode="auto">
+          <a:xfrm>
+            <a:off x="10415820" y="222684"/>
+            <a:ext cx="2126430" cy="1275858"/>
+          </a:xfrm>
+          <a:prstGeom prst="rect">
+            <a:avLst/>
+          </a:prstGeom>
+          <a:noFill/>
+          <a:extLst>
+            <a:ext uri="{909E8E84-426E-40DD-AFC4-6F175D3DCCD1}">
+              <a14:hiddenFill xmlns:a14="http://schemas.microsoft.com/office/drawing/2010/main">
+                <a:solidFill>
+                  <a:srgbClr val="FFFFFF"/>
+                </a:solidFill>
+              </a14:hiddenFill>
+            </a:ext>
+          </a:extLst>
+        </p:spPr>
+      </p:pic>
+      <p:sp>
+        <p:nvSpPr>
+          <p:cNvPr id="10" name="Rectangle 9">
+            <a:extLst>
+              <a:ext uri="{FF2B5EF4-FFF2-40B4-BE49-F238E27FC236}">
+                <a16:creationId xmlns:a16="http://schemas.microsoft.com/office/drawing/2014/main" id="{429079B8-08FB-4829-B5FD-0CE4BBAFCC70}"/>
+              </a:ext>
+            </a:extLst>
+          </p:cNvPr>
+          <p:cNvSpPr/>
+          <p:nvPr/>
+        </p:nvSpPr>
+        <p:spPr>
+          <a:xfrm>
+            <a:off x="960792" y="994742"/>
+            <a:ext cx="10006520" cy="456215"/>
+          </a:xfrm>
+          <a:prstGeom prst="rect">
+            <a:avLst/>
+          </a:prstGeom>
+        </p:spPr>
+        <p:txBody>
+          <a:bodyPr wrap="square">
+            <a:spAutoFit/>
+          </a:bodyPr>
+          <a:lstStyle/>
+          <a:p>
+            <a:pPr marL="285750" indent="-285750">
+              <a:lnSpc>
+                <a:spcPct val="150000"/>
+              </a:lnSpc>
+              <a:buFont typeface="Arial" panose="020B0604020202020204" pitchFamily="34" charset="0"/>
+              <a:buChar char="•"/>
+            </a:pPr>
+            <a:r>
+              <a:rPr lang="pt-BR" dirty="0"/>
+              <a:t>Alterar o </a:t>
+            </a:r>
+            <a:r>
+              <a:rPr lang="pt-BR" b="1" dirty="0"/>
+              <a:t>cursos-routing.module.ts</a:t>
+            </a:r>
+            <a:r>
+              <a:rPr lang="pt-BR" dirty="0"/>
+              <a:t> incluindo as rotas de curso </a:t>
+            </a:r>
+          </a:p>
+        </p:txBody>
+      </p:sp>
+      <p:pic>
+        <p:nvPicPr>
+          <p:cNvPr id="6" name="Picture 5">
+            <a:extLst>
+              <a:ext uri="{FF2B5EF4-FFF2-40B4-BE49-F238E27FC236}">
+                <a16:creationId xmlns:a16="http://schemas.microsoft.com/office/drawing/2014/main" id="{0DC88004-7592-49FD-8554-4F407F27AE30}"/>
+              </a:ext>
+            </a:extLst>
+          </p:cNvPr>
+          <p:cNvPicPr>
+            <a:picLocks noChangeAspect="1"/>
+          </p:cNvPicPr>
+          <p:nvPr/>
+        </p:nvPicPr>
+        <p:blipFill>
+          <a:blip r:embed="rId3"/>
+          <a:stretch>
+            <a:fillRect/>
+          </a:stretch>
+        </p:blipFill>
+        <p:spPr>
+          <a:xfrm>
+            <a:off x="2108175" y="1829706"/>
+            <a:ext cx="6962775" cy="3933825"/>
+          </a:xfrm>
+          <a:prstGeom prst="rect">
+            <a:avLst/>
+          </a:prstGeom>
+        </p:spPr>
+      </p:pic>
+    </p:spTree>
+    <p:extLst>
+      <p:ext uri="{BB962C8B-B14F-4D97-AF65-F5344CB8AC3E}">
+        <p14:creationId xmlns:p14="http://schemas.microsoft.com/office/powerpoint/2010/main" val="1647633167"/>
+      </p:ext>
+    </p:extLst>
+  </p:cSld>
+  <p:clrMapOvr>
+    <a:masterClrMapping/>
+  </p:clrMapOvr>
+  <p:transition>
+    <p:fade/>
+  </p:transition>
+</p:sld>
+</file>
+
+<file path=ppt/slides/slide18.xml><?xml version="1.0" encoding="utf-8"?>
+<p:sld xmlns:a="http://schemas.openxmlformats.org/drawingml/2006/main" xmlns:r="http://schemas.openxmlformats.org/officeDocument/2006/relationships" xmlns:p="http://schemas.openxmlformats.org/presentationml/2006/main">
+  <p:cSld>
+    <p:spTree>
+      <p:nvGrpSpPr>
+        <p:cNvPr id="1" name=""/>
+        <p:cNvGrpSpPr/>
+        <p:nvPr/>
+      </p:nvGrpSpPr>
+      <p:grpSpPr>
+        <a:xfrm>
+          <a:off x="0" y="0"/>
+          <a:ext cx="0" cy="0"/>
+          <a:chOff x="0" y="0"/>
+          <a:chExt cx="0" cy="0"/>
+        </a:xfrm>
+      </p:grpSpPr>
+      <p:sp>
+        <p:nvSpPr>
+          <p:cNvPr id="2" name="Slide Number Placeholder 1"/>
+          <p:cNvSpPr>
+            <a:spLocks noGrp="1"/>
+          </p:cNvSpPr>
+          <p:nvPr>
+            <p:ph type="sldNum" sz="quarter" idx="12"/>
+          </p:nvPr>
+        </p:nvSpPr>
+        <p:spPr/>
+        <p:txBody>
+          <a:bodyPr/>
+          <a:lstStyle/>
+          <a:p>
+            <a:fld id="{3847DB54-D037-B84F-B6F1-2E8DA40D09AD}" type="slidenum">
+              <a:rPr lang="en-US" smtClean="0"/>
+              <a:pPr/>
+              <a:t>18</a:t>
+            </a:fld>
+            <a:endParaRPr lang="en-US"/>
+          </a:p>
+        </p:txBody>
+      </p:sp>
+      <p:sp>
+        <p:nvSpPr>
+          <p:cNvPr id="5" name="Title 4"/>
+          <p:cNvSpPr>
+            <a:spLocks noGrp="1"/>
+          </p:cNvSpPr>
+          <p:nvPr>
+            <p:ph type="title"/>
+          </p:nvPr>
+        </p:nvSpPr>
+        <p:spPr>
+          <a:xfrm>
+            <a:off x="960792" y="390719"/>
+            <a:ext cx="10270415" cy="834964"/>
+          </a:xfrm>
+        </p:spPr>
+        <p:txBody>
+          <a:bodyPr/>
+          <a:lstStyle/>
+          <a:p>
+            <a:r>
+              <a:rPr lang="pt-BR" dirty="0"/>
+              <a:t>Rotas – Lazy Loading</a:t>
+            </a:r>
+            <a:endParaRPr lang="en-US" dirty="0"/>
+          </a:p>
+        </p:txBody>
+      </p:sp>
+      <p:pic>
+        <p:nvPicPr>
+          <p:cNvPr id="9" name="Picture 2" descr="Resultado de imagem para angularjs logo"/>
+          <p:cNvPicPr>
+            <a:picLocks noChangeAspect="1" noChangeArrowheads="1"/>
+          </p:cNvPicPr>
+          <p:nvPr/>
+        </p:nvPicPr>
+        <p:blipFill>
+          <a:blip r:embed="rId2">
+            <a:extLst>
+              <a:ext uri="{28A0092B-C50C-407E-A947-70E740481C1C}">
+                <a14:useLocalDpi xmlns:a14="http://schemas.microsoft.com/office/drawing/2010/main" val="0"/>
+              </a:ext>
+            </a:extLst>
+          </a:blip>
+          <a:srcRect/>
+          <a:stretch>
+            <a:fillRect/>
+          </a:stretch>
+        </p:blipFill>
+        <p:spPr bwMode="auto">
+          <a:xfrm>
+            <a:off x="10415820" y="222684"/>
+            <a:ext cx="2126430" cy="1275858"/>
+          </a:xfrm>
+          <a:prstGeom prst="rect">
+            <a:avLst/>
+          </a:prstGeom>
+          <a:noFill/>
+          <a:extLst>
+            <a:ext uri="{909E8E84-426E-40DD-AFC4-6F175D3DCCD1}">
+              <a14:hiddenFill xmlns:a14="http://schemas.microsoft.com/office/drawing/2010/main">
+                <a:solidFill>
+                  <a:srgbClr val="FFFFFF"/>
+                </a:solidFill>
+              </a14:hiddenFill>
+            </a:ext>
+          </a:extLst>
+        </p:spPr>
+      </p:pic>
+      <p:sp>
+        <p:nvSpPr>
+          <p:cNvPr id="10" name="Rectangle 9">
+            <a:extLst>
+              <a:ext uri="{FF2B5EF4-FFF2-40B4-BE49-F238E27FC236}">
+                <a16:creationId xmlns:a16="http://schemas.microsoft.com/office/drawing/2014/main" id="{429079B8-08FB-4829-B5FD-0CE4BBAFCC70}"/>
+              </a:ext>
+            </a:extLst>
+          </p:cNvPr>
+          <p:cNvSpPr/>
+          <p:nvPr/>
+        </p:nvSpPr>
+        <p:spPr>
+          <a:xfrm>
+            <a:off x="960792" y="994742"/>
+            <a:ext cx="10006520" cy="507831"/>
+          </a:xfrm>
+          <a:prstGeom prst="rect">
+            <a:avLst/>
+          </a:prstGeom>
+        </p:spPr>
+        <p:txBody>
+          <a:bodyPr wrap="square">
+            <a:spAutoFit/>
+          </a:bodyPr>
+          <a:lstStyle/>
+          <a:p>
+            <a:pPr marL="285750" indent="-285750">
+              <a:lnSpc>
+                <a:spcPct val="150000"/>
+              </a:lnSpc>
+              <a:buFont typeface="Arial" panose="020B0604020202020204" pitchFamily="34" charset="0"/>
+              <a:buChar char="•"/>
+            </a:pPr>
+            <a:r>
+              <a:rPr lang="pt-BR" dirty="0"/>
+              <a:t>Alterar o </a:t>
+            </a:r>
+            <a:r>
+              <a:rPr lang="pt-BR" b="1" dirty="0"/>
+              <a:t>app.routing.module.ts</a:t>
+            </a:r>
+            <a:r>
+              <a:rPr lang="pt-BR" dirty="0"/>
+              <a:t> para carregar o modulo de cursos via Lazy Loading</a:t>
+            </a:r>
+          </a:p>
+        </p:txBody>
+      </p:sp>
+      <p:pic>
+        <p:nvPicPr>
+          <p:cNvPr id="3" name="Picture 2">
+            <a:extLst>
+              <a:ext uri="{FF2B5EF4-FFF2-40B4-BE49-F238E27FC236}">
+                <a16:creationId xmlns:a16="http://schemas.microsoft.com/office/drawing/2014/main" id="{90EA856D-0484-4D3C-BFF0-DDD2B6689786}"/>
+              </a:ext>
+            </a:extLst>
+          </p:cNvPr>
+          <p:cNvPicPr>
+            <a:picLocks noChangeAspect="1"/>
+          </p:cNvPicPr>
+          <p:nvPr/>
+        </p:nvPicPr>
+        <p:blipFill>
+          <a:blip r:embed="rId3"/>
+          <a:stretch>
+            <a:fillRect/>
+          </a:stretch>
+        </p:blipFill>
+        <p:spPr>
+          <a:xfrm>
+            <a:off x="2296927" y="1498542"/>
+            <a:ext cx="7334250" cy="4152900"/>
+          </a:xfrm>
+          <a:prstGeom prst="rect">
+            <a:avLst/>
+          </a:prstGeom>
+        </p:spPr>
+      </p:pic>
+    </p:spTree>
+    <p:extLst>
+      <p:ext uri="{BB962C8B-B14F-4D97-AF65-F5344CB8AC3E}">
+        <p14:creationId xmlns:p14="http://schemas.microsoft.com/office/powerpoint/2010/main" val="4145589079"/>
+      </p:ext>
+    </p:extLst>
+  </p:cSld>
+  <p:clrMapOvr>
+    <a:masterClrMapping/>
+  </p:clrMapOvr>
+  <p:transition>
+    <p:fade/>
+  </p:transition>
+</p:sld>
+</file>
+
+<file path=ppt/slides/slide19.xml><?xml version="1.0" encoding="utf-8"?>
+<p:sld xmlns:a="http://schemas.openxmlformats.org/drawingml/2006/main" xmlns:r="http://schemas.openxmlformats.org/officeDocument/2006/relationships" xmlns:p="http://schemas.openxmlformats.org/presentationml/2006/main">
+  <p:cSld>
+    <p:spTree>
+      <p:nvGrpSpPr>
+        <p:cNvPr id="1" name=""/>
+        <p:cNvGrpSpPr/>
+        <p:nvPr/>
+      </p:nvGrpSpPr>
+      <p:grpSpPr>
+        <a:xfrm>
+          <a:off x="0" y="0"/>
+          <a:ext cx="0" cy="0"/>
+          <a:chOff x="0" y="0"/>
+          <a:chExt cx="0" cy="0"/>
+        </a:xfrm>
+      </p:grpSpPr>
+      <p:sp>
+        <p:nvSpPr>
+          <p:cNvPr id="2" name="Slide Number Placeholder 1"/>
+          <p:cNvSpPr>
+            <a:spLocks noGrp="1"/>
+          </p:cNvSpPr>
+          <p:nvPr>
+            <p:ph type="sldNum" sz="quarter" idx="12"/>
+          </p:nvPr>
+        </p:nvSpPr>
+        <p:spPr/>
+        <p:txBody>
+          <a:bodyPr/>
+          <a:lstStyle/>
+          <a:p>
+            <a:fld id="{3847DB54-D037-B84F-B6F1-2E8DA40D09AD}" type="slidenum">
+              <a:rPr lang="en-US" smtClean="0"/>
+              <a:pPr/>
+              <a:t>19</a:t>
+            </a:fld>
+            <a:endParaRPr lang="en-US"/>
+          </a:p>
+        </p:txBody>
+      </p:sp>
+      <p:sp>
+        <p:nvSpPr>
+          <p:cNvPr id="5" name="Title 4"/>
+          <p:cNvSpPr>
+            <a:spLocks noGrp="1"/>
+          </p:cNvSpPr>
+          <p:nvPr>
+            <p:ph type="title"/>
+          </p:nvPr>
+        </p:nvSpPr>
+        <p:spPr>
+          <a:xfrm>
+            <a:off x="960792" y="390719"/>
+            <a:ext cx="10270415" cy="834964"/>
+          </a:xfrm>
+        </p:spPr>
+        <p:txBody>
+          <a:bodyPr/>
+          <a:lstStyle/>
+          <a:p>
+            <a:r>
+              <a:rPr lang="pt-BR" dirty="0"/>
+              <a:t>Rotas – Lazy Loading</a:t>
+            </a:r>
+            <a:endParaRPr lang="en-US" dirty="0"/>
+          </a:p>
+        </p:txBody>
+      </p:sp>
+      <p:pic>
+        <p:nvPicPr>
+          <p:cNvPr id="9" name="Picture 2" descr="Resultado de imagem para angularjs logo"/>
+          <p:cNvPicPr>
+            <a:picLocks noChangeAspect="1" noChangeArrowheads="1"/>
+          </p:cNvPicPr>
+          <p:nvPr/>
+        </p:nvPicPr>
+        <p:blipFill>
+          <a:blip r:embed="rId2">
+            <a:extLst>
+              <a:ext uri="{28A0092B-C50C-407E-A947-70E740481C1C}">
+                <a14:useLocalDpi xmlns:a14="http://schemas.microsoft.com/office/drawing/2010/main" val="0"/>
+              </a:ext>
+            </a:extLst>
+          </a:blip>
+          <a:srcRect/>
+          <a:stretch>
+            <a:fillRect/>
+          </a:stretch>
+        </p:blipFill>
+        <p:spPr bwMode="auto">
+          <a:xfrm>
+            <a:off x="10415820" y="222684"/>
+            <a:ext cx="2126430" cy="1275858"/>
+          </a:xfrm>
+          <a:prstGeom prst="rect">
+            <a:avLst/>
+          </a:prstGeom>
+          <a:noFill/>
+          <a:extLst>
+            <a:ext uri="{909E8E84-426E-40DD-AFC4-6F175D3DCCD1}">
+              <a14:hiddenFill xmlns:a14="http://schemas.microsoft.com/office/drawing/2010/main">
+                <a:solidFill>
+                  <a:srgbClr val="FFFFFF"/>
+                </a:solidFill>
+              </a14:hiddenFill>
+            </a:ext>
+          </a:extLst>
+        </p:spPr>
+      </p:pic>
+      <p:pic>
+        <p:nvPicPr>
+          <p:cNvPr id="12" name="Picture 11">
+            <a:extLst>
+              <a:ext uri="{FF2B5EF4-FFF2-40B4-BE49-F238E27FC236}">
+                <a16:creationId xmlns:a16="http://schemas.microsoft.com/office/drawing/2014/main" id="{1256D68F-4F42-49B4-8824-6BC73B608D3E}"/>
+              </a:ext>
+            </a:extLst>
+          </p:cNvPr>
+          <p:cNvPicPr>
+            <a:picLocks noChangeAspect="1"/>
+          </p:cNvPicPr>
+          <p:nvPr/>
+        </p:nvPicPr>
+        <p:blipFill>
+          <a:blip r:embed="rId3"/>
+          <a:stretch>
+            <a:fillRect/>
+          </a:stretch>
+        </p:blipFill>
+        <p:spPr>
+          <a:xfrm>
+            <a:off x="777020" y="1666577"/>
+            <a:ext cx="2619375" cy="1190625"/>
+          </a:xfrm>
+          <a:prstGeom prst="rect">
+            <a:avLst/>
+          </a:prstGeom>
+        </p:spPr>
+      </p:pic>
+      <p:pic>
+        <p:nvPicPr>
+          <p:cNvPr id="13" name="Picture 12">
+            <a:extLst>
+              <a:ext uri="{FF2B5EF4-FFF2-40B4-BE49-F238E27FC236}">
+                <a16:creationId xmlns:a16="http://schemas.microsoft.com/office/drawing/2014/main" id="{D57B2D3A-8F9D-4FA4-8EA4-853316397A7A}"/>
+              </a:ext>
+            </a:extLst>
+          </p:cNvPr>
+          <p:cNvPicPr>
+            <a:picLocks noChangeAspect="1"/>
+          </p:cNvPicPr>
+          <p:nvPr/>
+        </p:nvPicPr>
+        <p:blipFill>
+          <a:blip r:embed="rId4"/>
+          <a:stretch>
+            <a:fillRect/>
+          </a:stretch>
+        </p:blipFill>
+        <p:spPr>
+          <a:xfrm>
+            <a:off x="777020" y="4537059"/>
+            <a:ext cx="2790825" cy="1152525"/>
+          </a:xfrm>
+          <a:prstGeom prst="rect">
+            <a:avLst/>
+          </a:prstGeom>
+        </p:spPr>
+      </p:pic>
+      <p:pic>
+        <p:nvPicPr>
+          <p:cNvPr id="14" name="Picture 13">
+            <a:extLst>
+              <a:ext uri="{FF2B5EF4-FFF2-40B4-BE49-F238E27FC236}">
+                <a16:creationId xmlns:a16="http://schemas.microsoft.com/office/drawing/2014/main" id="{5391DD4F-A777-42DF-9BD8-A530AF780826}"/>
+              </a:ext>
+            </a:extLst>
+          </p:cNvPr>
+          <p:cNvPicPr>
+            <a:picLocks noChangeAspect="1"/>
+          </p:cNvPicPr>
+          <p:nvPr/>
+        </p:nvPicPr>
+        <p:blipFill>
+          <a:blip r:embed="rId5"/>
+          <a:stretch>
+            <a:fillRect/>
+          </a:stretch>
+        </p:blipFill>
+        <p:spPr>
+          <a:xfrm>
+            <a:off x="741821" y="2756572"/>
+            <a:ext cx="11125200" cy="1495425"/>
+          </a:xfrm>
+          <a:prstGeom prst="rect">
+            <a:avLst/>
+          </a:prstGeom>
+        </p:spPr>
+      </p:pic>
+      <p:pic>
+        <p:nvPicPr>
+          <p:cNvPr id="15" name="Picture 14">
+            <a:extLst>
+              <a:ext uri="{FF2B5EF4-FFF2-40B4-BE49-F238E27FC236}">
+                <a16:creationId xmlns:a16="http://schemas.microsoft.com/office/drawing/2014/main" id="{BBB6756F-6E22-4F9D-B032-362B3D3D5123}"/>
+              </a:ext>
+            </a:extLst>
+          </p:cNvPr>
+          <p:cNvPicPr>
+            <a:picLocks noChangeAspect="1"/>
+          </p:cNvPicPr>
+          <p:nvPr/>
+        </p:nvPicPr>
+        <p:blipFill>
+          <a:blip r:embed="rId6"/>
+          <a:stretch>
+            <a:fillRect/>
+          </a:stretch>
+        </p:blipFill>
+        <p:spPr>
+          <a:xfrm>
+            <a:off x="741821" y="5680677"/>
+            <a:ext cx="11125200" cy="266700"/>
+          </a:xfrm>
+          <a:prstGeom prst="rect">
+            <a:avLst/>
+          </a:prstGeom>
+        </p:spPr>
+      </p:pic>
+      <p:sp>
+        <p:nvSpPr>
+          <p:cNvPr id="10" name="Rectangle 9">
+            <a:extLst>
+              <a:ext uri="{FF2B5EF4-FFF2-40B4-BE49-F238E27FC236}">
+                <a16:creationId xmlns:a16="http://schemas.microsoft.com/office/drawing/2014/main" id="{B128AB3B-9DCA-4306-8A0D-78C755CF4EEB}"/>
+              </a:ext>
+            </a:extLst>
+          </p:cNvPr>
+          <p:cNvSpPr/>
+          <p:nvPr/>
+        </p:nvSpPr>
+        <p:spPr>
+          <a:xfrm>
+            <a:off x="960792" y="994742"/>
+            <a:ext cx="10006520" cy="507831"/>
+          </a:xfrm>
+          <a:prstGeom prst="rect">
+            <a:avLst/>
+          </a:prstGeom>
+        </p:spPr>
+        <p:txBody>
+          <a:bodyPr wrap="square">
+            <a:spAutoFit/>
+          </a:bodyPr>
+          <a:lstStyle/>
+          <a:p>
+            <a:pPr marL="285750" indent="-285750">
+              <a:lnSpc>
+                <a:spcPct val="150000"/>
+              </a:lnSpc>
+              <a:buFont typeface="Arial" panose="020B0604020202020204" pitchFamily="34" charset="0"/>
+              <a:buChar char="•"/>
+            </a:pPr>
+            <a:r>
+              <a:rPr lang="pt-BR" dirty="0"/>
+              <a:t>Ao executar a aplicação</a:t>
+            </a:r>
+          </a:p>
+        </p:txBody>
+      </p:sp>
+    </p:spTree>
+    <p:extLst>
+      <p:ext uri="{BB962C8B-B14F-4D97-AF65-F5344CB8AC3E}">
+        <p14:creationId xmlns:p14="http://schemas.microsoft.com/office/powerpoint/2010/main" val="2373432250"/>
       </p:ext>
     </p:extLst>
   </p:cSld>
@@ -11496,6 +13143,12 @@
 </file>
 
 <file path=customXml/item1.xml><?xml version="1.0" encoding="utf-8"?>
+<p:properties xmlns:p="http://schemas.microsoft.com/office/2006/metadata/properties" xmlns:xsi="http://www.w3.org/2001/XMLSchema-instance" xmlns:pc="http://schemas.microsoft.com/office/infopath/2007/PartnerControls">
+  <documentManagement/>
+</p:properties>
+</file>
+
+<file path=customXml/item2.xml><?xml version="1.0" encoding="utf-8"?>
 <ct:contentTypeSchema xmlns:ct="http://schemas.microsoft.com/office/2006/metadata/contentType" xmlns:ma="http://schemas.microsoft.com/office/2006/metadata/properties/metaAttributes" ct:_="" ma:_="" ma:contentTypeName="Documento" ma:contentTypeID="0x01010036D5650AA20B9C4994D4F61BF86E88A5" ma:contentTypeVersion="2" ma:contentTypeDescription="Crie um novo documento." ma:contentTypeScope="" ma:versionID="5e061fff1f46b9b376a7df479f71f8c8">
   <xsd:schema xmlns:xsd="http://www.w3.org/2001/XMLSchema" xmlns:xs="http://www.w3.org/2001/XMLSchema" xmlns:p="http://schemas.microsoft.com/office/2006/metadata/properties" xmlns:ns2="07a316ae-5687-4ea8-90ab-e5c6f194d564" targetNamespace="http://schemas.microsoft.com/office/2006/metadata/properties" ma:root="true" ma:fieldsID="fa601322723508fdb4fa44b47fe0f447" ns2:_="">
     <xsd:import namespace="07a316ae-5687-4ea8-90ab-e5c6f194d564"/>
@@ -11627,12 +13280,6 @@
 </ct:contentTypeSchema>
 </file>
 
-<file path=customXml/item2.xml><?xml version="1.0" encoding="utf-8"?>
-<p:properties xmlns:p="http://schemas.microsoft.com/office/2006/metadata/properties" xmlns:xsi="http://www.w3.org/2001/XMLSchema-instance" xmlns:pc="http://schemas.microsoft.com/office/infopath/2007/PartnerControls">
-  <documentManagement/>
-</p:properties>
-</file>
-
 <file path=customXml/item3.xml><?xml version="1.0" encoding="utf-8"?>
 <?mso-contentType ?>
 <FormTemplates xmlns="http://schemas.microsoft.com/sharepoint/v3/contenttype/forms">
@@ -11643,6 +13290,15 @@
 </file>
 
 <file path=customXml/itemProps1.xml><?xml version="1.0" encoding="utf-8"?>
+<ds:datastoreItem xmlns:ds="http://schemas.openxmlformats.org/officeDocument/2006/customXml" ds:itemID="{840916AD-EA36-4B19-B020-346B3B08ACE2}">
+  <ds:schemaRefs>
+    <ds:schemaRef ds:uri="http://schemas.microsoft.com/office/2006/metadata/properties"/>
+    <ds:schemaRef ds:uri="http://schemas.microsoft.com/office/infopath/2007/PartnerControls"/>
+  </ds:schemaRefs>
+</ds:datastoreItem>
+</file>
+
+<file path=customXml/itemProps2.xml><?xml version="1.0" encoding="utf-8"?>
 <ds:datastoreItem xmlns:ds="http://schemas.openxmlformats.org/officeDocument/2006/customXml" ds:itemID="{971ED77C-6313-42D6-A059-131B9D4A2F34}">
   <ds:schemaRefs>
     <ds:schemaRef ds:uri="http://schemas.microsoft.com/office/2006/metadata/contentType"/>
@@ -11660,15 +13316,6 @@
 </ds:datastoreItem>
 </file>
 
-<file path=customXml/itemProps2.xml><?xml version="1.0" encoding="utf-8"?>
-<ds:datastoreItem xmlns:ds="http://schemas.openxmlformats.org/officeDocument/2006/customXml" ds:itemID="{840916AD-EA36-4B19-B020-346B3B08ACE2}">
-  <ds:schemaRefs>
-    <ds:schemaRef ds:uri="http://schemas.microsoft.com/office/2006/metadata/properties"/>
-    <ds:schemaRef ds:uri="http://schemas.microsoft.com/office/infopath/2007/PartnerControls"/>
-  </ds:schemaRefs>
-</ds:datastoreItem>
-</file>
-
 <file path=customXml/itemProps3.xml><?xml version="1.0" encoding="utf-8"?>
 <ds:datastoreItem xmlns:ds="http://schemas.openxmlformats.org/officeDocument/2006/customXml" ds:itemID="{CFC7BE12-D282-45D2-9360-ABE4B1901808}">
   <ds:schemaRefs>

</xml_diff>